<commit_message>
Update powerpoint with last minute touches.
</commit_message>
<xml_diff>
--- a/2018-02-11 Time Series.pptx
+++ b/2018-02-11 Time Series.pptx
@@ -5,21 +5,22 @@
     <p:sldMasterId id="2147483840" r:id="rId1"/>
   </p:sldMasterIdLst>
   <p:notesMasterIdLst>
-    <p:notesMasterId r:id="rId14"/>
+    <p:notesMasterId r:id="rId15"/>
   </p:notesMasterIdLst>
   <p:sldIdLst>
     <p:sldId id="256" r:id="rId2"/>
-    <p:sldId id="259" r:id="rId3"/>
-    <p:sldId id="257" r:id="rId4"/>
-    <p:sldId id="268" r:id="rId5"/>
-    <p:sldId id="267" r:id="rId6"/>
-    <p:sldId id="270" r:id="rId7"/>
-    <p:sldId id="276" r:id="rId8"/>
-    <p:sldId id="271" r:id="rId9"/>
-    <p:sldId id="272" r:id="rId10"/>
-    <p:sldId id="273" r:id="rId11"/>
-    <p:sldId id="274" r:id="rId12"/>
-    <p:sldId id="275" r:id="rId13"/>
+    <p:sldId id="257" r:id="rId3"/>
+    <p:sldId id="277" r:id="rId4"/>
+    <p:sldId id="259" r:id="rId5"/>
+    <p:sldId id="268" r:id="rId6"/>
+    <p:sldId id="267" r:id="rId7"/>
+    <p:sldId id="270" r:id="rId8"/>
+    <p:sldId id="276" r:id="rId9"/>
+    <p:sldId id="271" r:id="rId10"/>
+    <p:sldId id="272" r:id="rId11"/>
+    <p:sldId id="273" r:id="rId12"/>
+    <p:sldId id="274" r:id="rId13"/>
+    <p:sldId id="275" r:id="rId14"/>
   </p:sldIdLst>
   <p:sldSz cx="12192000" cy="6858000"/>
   <p:notesSz cx="6858000" cy="9144000"/>
@@ -118,6 +119,32 @@
       </a:defRPr>
     </a:lvl9pPr>
   </p:defaultTextStyle>
+  <p:extLst>
+    <p:ext uri="{521415D9-36F7-43E2-AB2F-B90AF26B5E84}">
+      <p14:sectionLst xmlns:p14="http://schemas.microsoft.com/office/powerpoint/2010/main">
+        <p14:section name="Default Section" id="{D7B7A6A2-1883-4E38-8049-464C8A8C5C92}">
+          <p14:sldIdLst>
+            <p14:sldId id="256"/>
+            <p14:sldId id="257"/>
+            <p14:sldId id="277"/>
+            <p14:sldId id="259"/>
+            <p14:sldId id="268"/>
+            <p14:sldId id="267"/>
+            <p14:sldId id="270"/>
+            <p14:sldId id="276"/>
+            <p14:sldId id="271"/>
+            <p14:sldId id="272"/>
+            <p14:sldId id="273"/>
+            <p14:sldId id="274"/>
+            <p14:sldId id="275"/>
+          </p14:sldIdLst>
+        </p14:section>
+      </p14:sectionLst>
+    </p:ext>
+    <p:ext uri="{EFAFB233-063F-42B5-8137-9DF3F51BA10A}">
+      <p15:sldGuideLst xmlns:p15="http://schemas.microsoft.com/office/powerpoint/2012/main"/>
+    </p:ext>
+  </p:extLst>
 </p:presentation>
 </file>
 
@@ -203,7 +230,7 @@
           <a:p>
             <a:fld id="{9ECD7694-E21E-400C-BB20-C9362601679A}" type="datetimeFigureOut">
               <a:rPr lang="en-US" smtClean="0"/>
-              <a:t>2/11/2018</a:t>
+              <a:t>2/14/2018</a:t>
             </a:fld>
             <a:endParaRPr lang="en-US"/>
           </a:p>
@@ -516,7 +543,7 @@
           <a:p>
             <a:r>
               <a:rPr lang="en-US" dirty="0"/>
-              <a:t>See a bump in the high PM2.5 months.  </a:t>
+              <a:t>Introduce myself:  Utah State and BYU for MS in statistics, Merrick Bank – Risk Analyst for 5 years, Intermountain Healthcare – Population Health almost 2 years.</a:t>
             </a:r>
           </a:p>
           <a:p>
@@ -525,8 +552,731 @@
           <a:p>
             <a:r>
               <a:rPr lang="en-US" dirty="0"/>
-              <a:t>I was seeing one the beginning of July, but once adjusting for Fireworks id dropped down.</a:t>
-            </a:r>
+              <a:t>Time series is that course I always wished I took in college.</a:t>
+            </a:r>
+          </a:p>
+        </p:txBody>
+      </p:sp>
+      <p:sp>
+        <p:nvSpPr>
+          <p:cNvPr id="4" name="Slide Number Placeholder 3"/>
+          <p:cNvSpPr>
+            <a:spLocks noGrp="1"/>
+          </p:cNvSpPr>
+          <p:nvPr>
+            <p:ph type="sldNum" sz="quarter" idx="10"/>
+          </p:nvPr>
+        </p:nvSpPr>
+        <p:spPr/>
+        <p:txBody>
+          <a:bodyPr/>
+          <a:lstStyle/>
+          <a:p>
+            <a:fld id="{213EDD61-84E5-43BC-99F2-79692E79CB0D}" type="slidenum">
+              <a:rPr lang="en-US" smtClean="0"/>
+              <a:t>1</a:t>
+            </a:fld>
+            <a:endParaRPr lang="en-US"/>
+          </a:p>
+        </p:txBody>
+      </p:sp>
+    </p:spTree>
+    <p:extLst>
+      <p:ext uri="{BB962C8B-B14F-4D97-AF65-F5344CB8AC3E}">
+        <p14:creationId xmlns:p14="http://schemas.microsoft.com/office/powerpoint/2010/main" val="3974045441"/>
+      </p:ext>
+    </p:extLst>
+  </p:cSld>
+  <p:clrMapOvr>
+    <a:masterClrMapping/>
+  </p:clrMapOvr>
+</p:notes>
+</file>
+
+<file path=ppt/notesSlides/notesSlide2.xml><?xml version="1.0" encoding="utf-8"?>
+<p:notes xmlns:a="http://schemas.openxmlformats.org/drawingml/2006/main" xmlns:r="http://schemas.openxmlformats.org/officeDocument/2006/relationships" xmlns:p="http://schemas.openxmlformats.org/presentationml/2006/main">
+  <p:cSld>
+    <p:spTree>
+      <p:nvGrpSpPr>
+        <p:cNvPr id="1" name=""/>
+        <p:cNvGrpSpPr/>
+        <p:nvPr/>
+      </p:nvGrpSpPr>
+      <p:grpSpPr>
+        <a:xfrm>
+          <a:off x="0" y="0"/>
+          <a:ext cx="0" cy="0"/>
+          <a:chOff x="0" y="0"/>
+          <a:chExt cx="0" cy="0"/>
+        </a:xfrm>
+      </p:grpSpPr>
+      <p:sp>
+        <p:nvSpPr>
+          <p:cNvPr id="2" name="Slide Image Placeholder 1"/>
+          <p:cNvSpPr>
+            <a:spLocks noGrp="1" noRot="1" noChangeAspect="1"/>
+          </p:cNvSpPr>
+          <p:nvPr>
+            <p:ph type="sldImg"/>
+          </p:nvPr>
+        </p:nvSpPr>
+        <p:spPr/>
+      </p:sp>
+      <p:sp>
+        <p:nvSpPr>
+          <p:cNvPr id="3" name="Notes Placeholder 2"/>
+          <p:cNvSpPr>
+            <a:spLocks noGrp="1"/>
+          </p:cNvSpPr>
+          <p:nvPr>
+            <p:ph type="body" idx="1"/>
+          </p:nvPr>
+        </p:nvSpPr>
+        <p:spPr/>
+        <p:txBody>
+          <a:bodyPr/>
+          <a:lstStyle/>
+          <a:p>
+            <a:r>
+              <a:rPr lang="en-US" dirty="0"/>
+              <a:t>So, why time series?</a:t>
+            </a:r>
+          </a:p>
+          <a:p>
+            <a:endParaRPr lang="en-US" dirty="0"/>
+          </a:p>
+          <a:p>
+            <a:r>
+              <a:rPr lang="en-US" dirty="0"/>
+              <a:t>This is “Practical Data Science” so this is the most math you’ll see in this presentation.</a:t>
+            </a:r>
+          </a:p>
+          <a:p>
+            <a:endParaRPr lang="en-US" dirty="0"/>
+          </a:p>
+          <a:p>
+            <a:r>
+              <a:rPr lang="en-US" dirty="0" err="1"/>
+              <a:t>iid</a:t>
+            </a:r>
+            <a:r>
+              <a:rPr lang="en-US" dirty="0"/>
+              <a:t> = “independent and identically distributed”</a:t>
+            </a:r>
+          </a:p>
+        </p:txBody>
+      </p:sp>
+      <p:sp>
+        <p:nvSpPr>
+          <p:cNvPr id="4" name="Slide Number Placeholder 3"/>
+          <p:cNvSpPr>
+            <a:spLocks noGrp="1"/>
+          </p:cNvSpPr>
+          <p:nvPr>
+            <p:ph type="sldNum" sz="quarter" idx="10"/>
+          </p:nvPr>
+        </p:nvSpPr>
+        <p:spPr/>
+        <p:txBody>
+          <a:bodyPr/>
+          <a:lstStyle/>
+          <a:p>
+            <a:fld id="{213EDD61-84E5-43BC-99F2-79692E79CB0D}" type="slidenum">
+              <a:rPr lang="en-US" smtClean="0"/>
+              <a:t>2</a:t>
+            </a:fld>
+            <a:endParaRPr lang="en-US"/>
+          </a:p>
+        </p:txBody>
+      </p:sp>
+    </p:spTree>
+    <p:extLst>
+      <p:ext uri="{BB962C8B-B14F-4D97-AF65-F5344CB8AC3E}">
+        <p14:creationId xmlns:p14="http://schemas.microsoft.com/office/powerpoint/2010/main" val="3855172691"/>
+      </p:ext>
+    </p:extLst>
+  </p:cSld>
+  <p:clrMapOvr>
+    <a:masterClrMapping/>
+  </p:clrMapOvr>
+</p:notes>
+</file>
+
+<file path=ppt/notesSlides/notesSlide3.xml><?xml version="1.0" encoding="utf-8"?>
+<p:notes xmlns:a="http://schemas.openxmlformats.org/drawingml/2006/main" xmlns:r="http://schemas.openxmlformats.org/officeDocument/2006/relationships" xmlns:p="http://schemas.openxmlformats.org/presentationml/2006/main">
+  <p:cSld>
+    <p:spTree>
+      <p:nvGrpSpPr>
+        <p:cNvPr id="1" name=""/>
+        <p:cNvGrpSpPr/>
+        <p:nvPr/>
+      </p:nvGrpSpPr>
+      <p:grpSpPr>
+        <a:xfrm>
+          <a:off x="0" y="0"/>
+          <a:ext cx="0" cy="0"/>
+          <a:chOff x="0" y="0"/>
+          <a:chExt cx="0" cy="0"/>
+        </a:xfrm>
+      </p:grpSpPr>
+      <p:sp>
+        <p:nvSpPr>
+          <p:cNvPr id="2" name="Slide Image Placeholder 1"/>
+          <p:cNvSpPr>
+            <a:spLocks noGrp="1" noRot="1" noChangeAspect="1"/>
+          </p:cNvSpPr>
+          <p:nvPr>
+            <p:ph type="sldImg"/>
+          </p:nvPr>
+        </p:nvSpPr>
+        <p:spPr/>
+      </p:sp>
+      <p:sp>
+        <p:nvSpPr>
+          <p:cNvPr id="3" name="Notes Placeholder 2"/>
+          <p:cNvSpPr>
+            <a:spLocks noGrp="1"/>
+          </p:cNvSpPr>
+          <p:nvPr>
+            <p:ph type="body" idx="1"/>
+          </p:nvPr>
+        </p:nvSpPr>
+        <p:spPr/>
+        <p:txBody>
+          <a:bodyPr/>
+          <a:lstStyle/>
+          <a:p>
+            <a:r>
+              <a:rPr lang="en-US" dirty="0"/>
+              <a:t>Here are a few examples of data that could be modeled as time series.  </a:t>
+            </a:r>
+          </a:p>
+          <a:p>
+            <a:pPr marL="171450" indent="-171450">
+              <a:buFont typeface="Arial" panose="020B0604020202020204" pitchFamily="34" charset="0"/>
+              <a:buChar char="•"/>
+            </a:pPr>
+            <a:r>
+              <a:rPr lang="en-US" dirty="0"/>
+              <a:t>Cyclic</a:t>
+            </a:r>
+          </a:p>
+          <a:p>
+            <a:pPr marL="171450" indent="-171450">
+              <a:buFont typeface="Arial" panose="020B0604020202020204" pitchFamily="34" charset="0"/>
+              <a:buChar char="•"/>
+            </a:pPr>
+            <a:r>
+              <a:rPr lang="en-US" dirty="0"/>
+              <a:t>Seasonality</a:t>
+            </a:r>
+          </a:p>
+          <a:p>
+            <a:pPr marL="171450" indent="-171450">
+              <a:buFont typeface="Arial" panose="020B0604020202020204" pitchFamily="34" charset="0"/>
+              <a:buChar char="•"/>
+            </a:pPr>
+            <a:r>
+              <a:rPr lang="en-US" dirty="0"/>
+              <a:t>Autocorrelation (correlation to prior values of data)</a:t>
+            </a:r>
+          </a:p>
+        </p:txBody>
+      </p:sp>
+      <p:sp>
+        <p:nvSpPr>
+          <p:cNvPr id="4" name="Slide Number Placeholder 3"/>
+          <p:cNvSpPr>
+            <a:spLocks noGrp="1"/>
+          </p:cNvSpPr>
+          <p:nvPr>
+            <p:ph type="sldNum" sz="quarter" idx="10"/>
+          </p:nvPr>
+        </p:nvSpPr>
+        <p:spPr/>
+        <p:txBody>
+          <a:bodyPr/>
+          <a:lstStyle/>
+          <a:p>
+            <a:fld id="{213EDD61-84E5-43BC-99F2-79692E79CB0D}" type="slidenum">
+              <a:rPr lang="en-US" smtClean="0"/>
+              <a:t>3</a:t>
+            </a:fld>
+            <a:endParaRPr lang="en-US"/>
+          </a:p>
+        </p:txBody>
+      </p:sp>
+    </p:spTree>
+    <p:extLst>
+      <p:ext uri="{BB962C8B-B14F-4D97-AF65-F5344CB8AC3E}">
+        <p14:creationId xmlns:p14="http://schemas.microsoft.com/office/powerpoint/2010/main" val="4102710784"/>
+      </p:ext>
+    </p:extLst>
+  </p:cSld>
+  <p:clrMapOvr>
+    <a:masterClrMapping/>
+  </p:clrMapOvr>
+</p:notes>
+</file>
+
+<file path=ppt/notesSlides/notesSlide4.xml><?xml version="1.0" encoding="utf-8"?>
+<p:notes xmlns:a="http://schemas.openxmlformats.org/drawingml/2006/main" xmlns:r="http://schemas.openxmlformats.org/officeDocument/2006/relationships" xmlns:p="http://schemas.openxmlformats.org/presentationml/2006/main">
+  <p:cSld>
+    <p:spTree>
+      <p:nvGrpSpPr>
+        <p:cNvPr id="1" name=""/>
+        <p:cNvGrpSpPr/>
+        <p:nvPr/>
+      </p:nvGrpSpPr>
+      <p:grpSpPr>
+        <a:xfrm>
+          <a:off x="0" y="0"/>
+          <a:ext cx="0" cy="0"/>
+          <a:chOff x="0" y="0"/>
+          <a:chExt cx="0" cy="0"/>
+        </a:xfrm>
+      </p:grpSpPr>
+      <p:sp>
+        <p:nvSpPr>
+          <p:cNvPr id="2" name="Slide Image Placeholder 1"/>
+          <p:cNvSpPr>
+            <a:spLocks noGrp="1" noRot="1" noChangeAspect="1"/>
+          </p:cNvSpPr>
+          <p:nvPr>
+            <p:ph type="sldImg"/>
+          </p:nvPr>
+        </p:nvSpPr>
+        <p:spPr/>
+      </p:sp>
+      <p:sp>
+        <p:nvSpPr>
+          <p:cNvPr id="3" name="Notes Placeholder 2"/>
+          <p:cNvSpPr>
+            <a:spLocks noGrp="1"/>
+          </p:cNvSpPr>
+          <p:nvPr>
+            <p:ph type="body" idx="1"/>
+          </p:nvPr>
+        </p:nvSpPr>
+        <p:spPr/>
+        <p:txBody>
+          <a:bodyPr/>
+          <a:lstStyle/>
+          <a:p>
+            <a:r>
+              <a:rPr lang="en-US" dirty="0"/>
+              <a:t>In this demo, I’ll be using data obtained from the EPA and National Center for Environmental Information.</a:t>
+            </a:r>
+          </a:p>
+          <a:p>
+            <a:endParaRPr lang="en-US" dirty="0"/>
+          </a:p>
+          <a:p>
+            <a:r>
+              <a:rPr lang="en-US" dirty="0"/>
+              <a:t>Inversion is where Valley temperature is colder than at the Peak, which essentially puts a “cap” on the valley, not allowing air to escape.</a:t>
+            </a:r>
+          </a:p>
+          <a:p>
+            <a:endParaRPr lang="en-US" dirty="0"/>
+          </a:p>
+          <a:p>
+            <a:r>
+              <a:rPr lang="en-US" dirty="0"/>
+              <a:t>Firework holidays are New Years, week of July 4</a:t>
+            </a:r>
+            <a:r>
+              <a:rPr lang="en-US" baseline="30000" dirty="0"/>
+              <a:t>th</a:t>
+            </a:r>
+            <a:r>
+              <a:rPr lang="en-US" dirty="0"/>
+              <a:t> and week of July 24</a:t>
+            </a:r>
+            <a:r>
+              <a:rPr lang="en-US" baseline="30000" dirty="0"/>
+              <a:t>th</a:t>
+            </a:r>
+            <a:r>
+              <a:rPr lang="en-US" dirty="0"/>
+              <a:t>.</a:t>
+            </a:r>
+          </a:p>
+        </p:txBody>
+      </p:sp>
+      <p:sp>
+        <p:nvSpPr>
+          <p:cNvPr id="4" name="Slide Number Placeholder 3"/>
+          <p:cNvSpPr>
+            <a:spLocks noGrp="1"/>
+          </p:cNvSpPr>
+          <p:nvPr>
+            <p:ph type="sldNum" sz="quarter" idx="10"/>
+          </p:nvPr>
+        </p:nvSpPr>
+        <p:spPr/>
+        <p:txBody>
+          <a:bodyPr/>
+          <a:lstStyle/>
+          <a:p>
+            <a:fld id="{213EDD61-84E5-43BC-99F2-79692E79CB0D}" type="slidenum">
+              <a:rPr lang="en-US" smtClean="0"/>
+              <a:t>4</a:t>
+            </a:fld>
+            <a:endParaRPr lang="en-US"/>
+          </a:p>
+        </p:txBody>
+      </p:sp>
+    </p:spTree>
+    <p:extLst>
+      <p:ext uri="{BB962C8B-B14F-4D97-AF65-F5344CB8AC3E}">
+        <p14:creationId xmlns:p14="http://schemas.microsoft.com/office/powerpoint/2010/main" val="2909734644"/>
+      </p:ext>
+    </p:extLst>
+  </p:cSld>
+  <p:clrMapOvr>
+    <a:masterClrMapping/>
+  </p:clrMapOvr>
+</p:notes>
+</file>
+
+<file path=ppt/notesSlides/notesSlide5.xml><?xml version="1.0" encoding="utf-8"?>
+<p:notes xmlns:a="http://schemas.openxmlformats.org/drawingml/2006/main" xmlns:r="http://schemas.openxmlformats.org/officeDocument/2006/relationships" xmlns:p="http://schemas.openxmlformats.org/presentationml/2006/main">
+  <p:cSld>
+    <p:spTree>
+      <p:nvGrpSpPr>
+        <p:cNvPr id="1" name=""/>
+        <p:cNvGrpSpPr/>
+        <p:nvPr/>
+      </p:nvGrpSpPr>
+      <p:grpSpPr>
+        <a:xfrm>
+          <a:off x="0" y="0"/>
+          <a:ext cx="0" cy="0"/>
+          <a:chOff x="0" y="0"/>
+          <a:chExt cx="0" cy="0"/>
+        </a:xfrm>
+      </p:grpSpPr>
+      <p:sp>
+        <p:nvSpPr>
+          <p:cNvPr id="2" name="Slide Image Placeholder 1"/>
+          <p:cNvSpPr>
+            <a:spLocks noGrp="1" noRot="1" noChangeAspect="1"/>
+          </p:cNvSpPr>
+          <p:nvPr>
+            <p:ph type="sldImg"/>
+          </p:nvPr>
+        </p:nvSpPr>
+        <p:spPr/>
+      </p:sp>
+      <p:sp>
+        <p:nvSpPr>
+          <p:cNvPr id="3" name="Notes Placeholder 2"/>
+          <p:cNvSpPr>
+            <a:spLocks noGrp="1"/>
+          </p:cNvSpPr>
+          <p:nvPr>
+            <p:ph type="body" idx="1"/>
+          </p:nvPr>
+        </p:nvSpPr>
+        <p:spPr/>
+        <p:txBody>
+          <a:bodyPr/>
+          <a:lstStyle/>
+          <a:p>
+            <a:r>
+              <a:rPr lang="en-US" dirty="0"/>
+              <a:t>How do we cross-validate in time series?</a:t>
+            </a:r>
+          </a:p>
+          <a:p>
+            <a:endParaRPr lang="en-US" dirty="0"/>
+          </a:p>
+          <a:p>
+            <a:r>
+              <a:rPr lang="en-US" dirty="0"/>
+              <a:t>We take a rolling window and split it into two parts:</a:t>
+            </a:r>
+          </a:p>
+          <a:p>
+            <a:pPr marL="171450" indent="-171450">
+              <a:buFont typeface="Arial" panose="020B0604020202020204" pitchFamily="34" charset="0"/>
+              <a:buChar char="•"/>
+            </a:pPr>
+            <a:r>
+              <a:rPr lang="en-US" dirty="0"/>
+              <a:t>Initial period</a:t>
+            </a:r>
+          </a:p>
+          <a:p>
+            <a:pPr marL="171450" indent="-171450">
+              <a:buFont typeface="Arial" panose="020B0604020202020204" pitchFamily="34" charset="0"/>
+              <a:buChar char="•"/>
+            </a:pPr>
+            <a:r>
+              <a:rPr lang="en-US" dirty="0"/>
+              <a:t>Horizon</a:t>
+            </a:r>
+          </a:p>
+          <a:p>
+            <a:pPr marL="0" indent="0">
+              <a:buFont typeface="Arial" panose="020B0604020202020204" pitchFamily="34" charset="0"/>
+              <a:buNone/>
+            </a:pPr>
+            <a:endParaRPr lang="en-US" dirty="0"/>
+          </a:p>
+          <a:p>
+            <a:pPr marL="0" indent="0">
+              <a:buFont typeface="Arial" panose="020B0604020202020204" pitchFamily="34" charset="0"/>
+              <a:buNone/>
+            </a:pPr>
+            <a:r>
+              <a:rPr lang="en-US" dirty="0"/>
+              <a:t>Move our window forward and repeat.  </a:t>
+            </a:r>
+          </a:p>
+          <a:p>
+            <a:pPr marL="0" indent="0">
+              <a:buFont typeface="Arial" panose="020B0604020202020204" pitchFamily="34" charset="0"/>
+              <a:buNone/>
+            </a:pPr>
+            <a:endParaRPr lang="en-US" dirty="0"/>
+          </a:p>
+          <a:p>
+            <a:pPr marL="0" indent="0">
+              <a:buFont typeface="Arial" panose="020B0604020202020204" pitchFamily="34" charset="0"/>
+              <a:buNone/>
+            </a:pPr>
+            <a:r>
+              <a:rPr lang="en-US" dirty="0"/>
+              <a:t>This provides us the ability to compute the residuals for each time period in the horizon. Once we have this we can compute a number of loss functions.  I’ll be using RMSE (root mean squared error).</a:t>
+            </a:r>
+          </a:p>
+        </p:txBody>
+      </p:sp>
+      <p:sp>
+        <p:nvSpPr>
+          <p:cNvPr id="4" name="Slide Number Placeholder 3"/>
+          <p:cNvSpPr>
+            <a:spLocks noGrp="1"/>
+          </p:cNvSpPr>
+          <p:nvPr>
+            <p:ph type="sldNum" sz="quarter" idx="10"/>
+          </p:nvPr>
+        </p:nvSpPr>
+        <p:spPr/>
+        <p:txBody>
+          <a:bodyPr/>
+          <a:lstStyle/>
+          <a:p>
+            <a:fld id="{213EDD61-84E5-43BC-99F2-79692E79CB0D}" type="slidenum">
+              <a:rPr lang="en-US" smtClean="0"/>
+              <a:t>6</a:t>
+            </a:fld>
+            <a:endParaRPr lang="en-US"/>
+          </a:p>
+        </p:txBody>
+      </p:sp>
+    </p:spTree>
+    <p:extLst>
+      <p:ext uri="{BB962C8B-B14F-4D97-AF65-F5344CB8AC3E}">
+        <p14:creationId xmlns:p14="http://schemas.microsoft.com/office/powerpoint/2010/main" val="578802902"/>
+      </p:ext>
+    </p:extLst>
+  </p:cSld>
+  <p:clrMapOvr>
+    <a:masterClrMapping/>
+  </p:clrMapOvr>
+</p:notes>
+</file>
+
+<file path=ppt/notesSlides/notesSlide6.xml><?xml version="1.0" encoding="utf-8"?>
+<p:notes xmlns:a="http://schemas.openxmlformats.org/drawingml/2006/main" xmlns:r="http://schemas.openxmlformats.org/officeDocument/2006/relationships" xmlns:p="http://schemas.openxmlformats.org/presentationml/2006/main">
+  <p:cSld>
+    <p:spTree>
+      <p:nvGrpSpPr>
+        <p:cNvPr id="1" name=""/>
+        <p:cNvGrpSpPr/>
+        <p:nvPr/>
+      </p:nvGrpSpPr>
+      <p:grpSpPr>
+        <a:xfrm>
+          <a:off x="0" y="0"/>
+          <a:ext cx="0" cy="0"/>
+          <a:chOff x="0" y="0"/>
+          <a:chExt cx="0" cy="0"/>
+        </a:xfrm>
+      </p:grpSpPr>
+      <p:sp>
+        <p:nvSpPr>
+          <p:cNvPr id="2" name="Slide Image Placeholder 1"/>
+          <p:cNvSpPr>
+            <a:spLocks noGrp="1" noRot="1" noChangeAspect="1"/>
+          </p:cNvSpPr>
+          <p:nvPr>
+            <p:ph type="sldImg"/>
+          </p:nvPr>
+        </p:nvSpPr>
+        <p:spPr/>
+      </p:sp>
+      <p:sp>
+        <p:nvSpPr>
+          <p:cNvPr id="3" name="Notes Placeholder 2"/>
+          <p:cNvSpPr>
+            <a:spLocks noGrp="1"/>
+          </p:cNvSpPr>
+          <p:nvPr>
+            <p:ph type="body" idx="1"/>
+          </p:nvPr>
+        </p:nvSpPr>
+        <p:spPr/>
+        <p:txBody>
+          <a:bodyPr/>
+          <a:lstStyle/>
+          <a:p>
+            <a:r>
+              <a:rPr lang="en-US" dirty="0"/>
+              <a:t>Ironically, in this data, the regression methods (OLS and RF) performed very similarly to Prophet, ARIMA, TBATS, etc.</a:t>
+            </a:r>
+          </a:p>
+          <a:p>
+            <a:endParaRPr lang="en-US" dirty="0"/>
+          </a:p>
+          <a:p>
+            <a:r>
+              <a:rPr lang="en-US" dirty="0"/>
+              <a:t>ETS doesn’t seem to be a good fit for this data.</a:t>
+            </a:r>
+          </a:p>
+        </p:txBody>
+      </p:sp>
+      <p:sp>
+        <p:nvSpPr>
+          <p:cNvPr id="4" name="Slide Number Placeholder 3"/>
+          <p:cNvSpPr>
+            <a:spLocks noGrp="1"/>
+          </p:cNvSpPr>
+          <p:nvPr>
+            <p:ph type="sldNum" sz="quarter" idx="10"/>
+          </p:nvPr>
+        </p:nvSpPr>
+        <p:spPr/>
+        <p:txBody>
+          <a:bodyPr/>
+          <a:lstStyle/>
+          <a:p>
+            <a:fld id="{213EDD61-84E5-43BC-99F2-79692E79CB0D}" type="slidenum">
+              <a:rPr lang="en-US" smtClean="0"/>
+              <a:t>7</a:t>
+            </a:fld>
+            <a:endParaRPr lang="en-US"/>
+          </a:p>
+        </p:txBody>
+      </p:sp>
+    </p:spTree>
+    <p:extLst>
+      <p:ext uri="{BB962C8B-B14F-4D97-AF65-F5344CB8AC3E}">
+        <p14:creationId xmlns:p14="http://schemas.microsoft.com/office/powerpoint/2010/main" val="2805250399"/>
+      </p:ext>
+    </p:extLst>
+  </p:cSld>
+  <p:clrMapOvr>
+    <a:masterClrMapping/>
+  </p:clrMapOvr>
+</p:notes>
+</file>
+
+<file path=ppt/notesSlides/notesSlide7.xml><?xml version="1.0" encoding="utf-8"?>
+<p:notes xmlns:a="http://schemas.openxmlformats.org/drawingml/2006/main" xmlns:r="http://schemas.openxmlformats.org/officeDocument/2006/relationships" xmlns:p="http://schemas.openxmlformats.org/presentationml/2006/main">
+  <p:cSld>
+    <p:spTree>
+      <p:nvGrpSpPr>
+        <p:cNvPr id="1" name=""/>
+        <p:cNvGrpSpPr/>
+        <p:nvPr/>
+      </p:nvGrpSpPr>
+      <p:grpSpPr>
+        <a:xfrm>
+          <a:off x="0" y="0"/>
+          <a:ext cx="0" cy="0"/>
+          <a:chOff x="0" y="0"/>
+          <a:chExt cx="0" cy="0"/>
+        </a:xfrm>
+      </p:grpSpPr>
+      <p:sp>
+        <p:nvSpPr>
+          <p:cNvPr id="2" name="Slide Image Placeholder 1"/>
+          <p:cNvSpPr>
+            <a:spLocks noGrp="1" noRot="1" noChangeAspect="1"/>
+          </p:cNvSpPr>
+          <p:nvPr>
+            <p:ph type="sldImg"/>
+          </p:nvPr>
+        </p:nvSpPr>
+        <p:spPr/>
+      </p:sp>
+      <p:sp>
+        <p:nvSpPr>
+          <p:cNvPr id="3" name="Notes Placeholder 2"/>
+          <p:cNvSpPr>
+            <a:spLocks noGrp="1"/>
+          </p:cNvSpPr>
+          <p:nvPr>
+            <p:ph type="body" idx="1"/>
+          </p:nvPr>
+        </p:nvSpPr>
+        <p:spPr/>
+        <p:txBody>
+          <a:bodyPr/>
+          <a:lstStyle/>
+          <a:p>
+            <a:r>
+              <a:rPr lang="en-US" dirty="0"/>
+              <a:t>A few things to notice here: </a:t>
+            </a:r>
+          </a:p>
+          <a:p>
+            <a:pPr marL="171450" indent="-171450">
+              <a:buFont typeface="Arial" panose="020B0604020202020204" pitchFamily="34" charset="0"/>
+              <a:buChar char="•"/>
+            </a:pPr>
+            <a:r>
+              <a:rPr lang="en-US" dirty="0"/>
+              <a:t>ARIMA appears to not be robust enough for shifts in the trend.</a:t>
+            </a:r>
+          </a:p>
+          <a:p>
+            <a:pPr marL="171450" indent="-171450">
+              <a:buFont typeface="Arial" panose="020B0604020202020204" pitchFamily="34" charset="0"/>
+              <a:buChar char="•"/>
+            </a:pPr>
+            <a:r>
+              <a:rPr lang="en-US" dirty="0"/>
+              <a:t>ETS is not a good fit, limited to one seasonality.</a:t>
+            </a:r>
+          </a:p>
+          <a:p>
+            <a:pPr marL="171450" indent="-171450">
+              <a:buFont typeface="Arial" panose="020B0604020202020204" pitchFamily="34" charset="0"/>
+              <a:buChar char="•"/>
+            </a:pPr>
+            <a:r>
+              <a:rPr lang="en-US" dirty="0"/>
+              <a:t>Both Linear and RF regression are straight lines since I purposely just picked the last value for weather forecasts</a:t>
+            </a:r>
+          </a:p>
+          <a:p>
+            <a:pPr marL="171450" indent="-171450">
+              <a:buFont typeface="Arial" panose="020B0604020202020204" pitchFamily="34" charset="0"/>
+              <a:buChar char="•"/>
+            </a:pPr>
+            <a:r>
+              <a:rPr lang="en-US" dirty="0"/>
+              <a:t>Both Prophet and TBATS seem to be ale to adjust… however as you get further out in TBATS it tends toward an average.</a:t>
+            </a:r>
+          </a:p>
+          <a:p>
+            <a:endParaRPr lang="en-US" dirty="0"/>
           </a:p>
         </p:txBody>
       </p:sp>
@@ -556,7 +1306,199 @@
     </p:spTree>
     <p:extLst>
       <p:ext uri="{BB962C8B-B14F-4D97-AF65-F5344CB8AC3E}">
+        <p14:creationId xmlns:p14="http://schemas.microsoft.com/office/powerpoint/2010/main" val="2559377927"/>
+      </p:ext>
+    </p:extLst>
+  </p:cSld>
+  <p:clrMapOvr>
+    <a:masterClrMapping/>
+  </p:clrMapOvr>
+</p:notes>
+</file>
+
+<file path=ppt/notesSlides/notesSlide8.xml><?xml version="1.0" encoding="utf-8"?>
+<p:notes xmlns:a="http://schemas.openxmlformats.org/drawingml/2006/main" xmlns:r="http://schemas.openxmlformats.org/officeDocument/2006/relationships" xmlns:p="http://schemas.openxmlformats.org/presentationml/2006/main">
+  <p:cSld>
+    <p:spTree>
+      <p:nvGrpSpPr>
+        <p:cNvPr id="1" name=""/>
+        <p:cNvGrpSpPr/>
+        <p:nvPr/>
+      </p:nvGrpSpPr>
+      <p:grpSpPr>
+        <a:xfrm>
+          <a:off x="0" y="0"/>
+          <a:ext cx="0" cy="0"/>
+          <a:chOff x="0" y="0"/>
+          <a:chExt cx="0" cy="0"/>
+        </a:xfrm>
+      </p:grpSpPr>
+      <p:sp>
+        <p:nvSpPr>
+          <p:cNvPr id="2" name="Slide Image Placeholder 1"/>
+          <p:cNvSpPr>
+            <a:spLocks noGrp="1" noRot="1" noChangeAspect="1"/>
+          </p:cNvSpPr>
+          <p:nvPr>
+            <p:ph type="sldImg"/>
+          </p:nvPr>
+        </p:nvSpPr>
+        <p:spPr/>
+      </p:sp>
+      <p:sp>
+        <p:nvSpPr>
+          <p:cNvPr id="3" name="Notes Placeholder 2"/>
+          <p:cNvSpPr>
+            <a:spLocks noGrp="1"/>
+          </p:cNvSpPr>
+          <p:nvPr>
+            <p:ph type="body" idx="1"/>
+          </p:nvPr>
+        </p:nvSpPr>
+        <p:spPr/>
+        <p:txBody>
+          <a:bodyPr/>
+          <a:lstStyle/>
+          <a:p>
+            <a:r>
+              <a:rPr lang="en-US" dirty="0"/>
+              <a:t>See a bump in the high PM2.5 months.  When we have high levels of PM2.5, they can be really high.  I’ve used the square-root transformation of PM2.5 to help adjust for this in my models.</a:t>
+            </a:r>
+          </a:p>
+          <a:p>
+            <a:endParaRPr lang="en-US" dirty="0"/>
+          </a:p>
+          <a:p>
+            <a:r>
+              <a:rPr lang="en-US" dirty="0"/>
+              <a:t>But still these time periods are more difficult to predict than low PM2.5 months.</a:t>
+            </a:r>
+          </a:p>
+          <a:p>
+            <a:endParaRPr lang="en-US" dirty="0"/>
+          </a:p>
+          <a:p>
+            <a:r>
+              <a:rPr lang="en-US" dirty="0"/>
+              <a:t>I was seeing one the beginning of July, but once adjusting for Fireworks it dropped down.</a:t>
+            </a:r>
+          </a:p>
+        </p:txBody>
+      </p:sp>
+      <p:sp>
+        <p:nvSpPr>
+          <p:cNvPr id="4" name="Slide Number Placeholder 3"/>
+          <p:cNvSpPr>
+            <a:spLocks noGrp="1"/>
+          </p:cNvSpPr>
+          <p:nvPr>
+            <p:ph type="sldNum" sz="quarter" idx="10"/>
+          </p:nvPr>
+        </p:nvSpPr>
+        <p:spPr/>
+        <p:txBody>
+          <a:bodyPr/>
+          <a:lstStyle/>
+          <a:p>
+            <a:fld id="{213EDD61-84E5-43BC-99F2-79692E79CB0D}" type="slidenum">
+              <a:rPr lang="en-US" smtClean="0"/>
+              <a:t>9</a:t>
+            </a:fld>
+            <a:endParaRPr lang="en-US"/>
+          </a:p>
+        </p:txBody>
+      </p:sp>
+    </p:spTree>
+    <p:extLst>
+      <p:ext uri="{BB962C8B-B14F-4D97-AF65-F5344CB8AC3E}">
         <p14:creationId xmlns:p14="http://schemas.microsoft.com/office/powerpoint/2010/main" val="2150799006"/>
+      </p:ext>
+    </p:extLst>
+  </p:cSld>
+  <p:clrMapOvr>
+    <a:masterClrMapping/>
+  </p:clrMapOvr>
+</p:notes>
+</file>
+
+<file path=ppt/notesSlides/notesSlide9.xml><?xml version="1.0" encoding="utf-8"?>
+<p:notes xmlns:a="http://schemas.openxmlformats.org/drawingml/2006/main" xmlns:r="http://schemas.openxmlformats.org/officeDocument/2006/relationships" xmlns:p="http://schemas.openxmlformats.org/presentationml/2006/main">
+  <p:cSld>
+    <p:spTree>
+      <p:nvGrpSpPr>
+        <p:cNvPr id="1" name=""/>
+        <p:cNvGrpSpPr/>
+        <p:nvPr/>
+      </p:nvGrpSpPr>
+      <p:grpSpPr>
+        <a:xfrm>
+          <a:off x="0" y="0"/>
+          <a:ext cx="0" cy="0"/>
+          <a:chOff x="0" y="0"/>
+          <a:chExt cx="0" cy="0"/>
+        </a:xfrm>
+      </p:grpSpPr>
+      <p:sp>
+        <p:nvSpPr>
+          <p:cNvPr id="2" name="Slide Image Placeholder 1"/>
+          <p:cNvSpPr>
+            <a:spLocks noGrp="1" noRot="1" noChangeAspect="1"/>
+          </p:cNvSpPr>
+          <p:nvPr>
+            <p:ph type="sldImg"/>
+          </p:nvPr>
+        </p:nvSpPr>
+        <p:spPr/>
+      </p:sp>
+      <p:sp>
+        <p:nvSpPr>
+          <p:cNvPr id="3" name="Notes Placeholder 2"/>
+          <p:cNvSpPr>
+            <a:spLocks noGrp="1"/>
+          </p:cNvSpPr>
+          <p:nvPr>
+            <p:ph type="body" idx="1"/>
+          </p:nvPr>
+        </p:nvSpPr>
+        <p:spPr/>
+        <p:txBody>
+          <a:bodyPr/>
+          <a:lstStyle/>
+          <a:p>
+            <a:r>
+              <a:rPr lang="en-US" dirty="0"/>
+              <a:t>Did this feel like a firehose?  Well, if so… here are some great resources to expand your knowledge of time series.</a:t>
+            </a:r>
+          </a:p>
+        </p:txBody>
+      </p:sp>
+      <p:sp>
+        <p:nvSpPr>
+          <p:cNvPr id="4" name="Slide Number Placeholder 3"/>
+          <p:cNvSpPr>
+            <a:spLocks noGrp="1"/>
+          </p:cNvSpPr>
+          <p:nvPr>
+            <p:ph type="sldNum" sz="quarter" idx="10"/>
+          </p:nvPr>
+        </p:nvSpPr>
+        <p:spPr/>
+        <p:txBody>
+          <a:bodyPr/>
+          <a:lstStyle/>
+          <a:p>
+            <a:fld id="{213EDD61-84E5-43BC-99F2-79692E79CB0D}" type="slidenum">
+              <a:rPr lang="en-US" smtClean="0"/>
+              <a:t>11</a:t>
+            </a:fld>
+            <a:endParaRPr lang="en-US"/>
+          </a:p>
+        </p:txBody>
+      </p:sp>
+    </p:spTree>
+    <p:extLst>
+      <p:ext uri="{BB962C8B-B14F-4D97-AF65-F5344CB8AC3E}">
+        <p14:creationId xmlns:p14="http://schemas.microsoft.com/office/powerpoint/2010/main" val="2690136945"/>
       </p:ext>
     </p:extLst>
   </p:cSld>
@@ -971,7 +1913,7 @@
           <a:p>
             <a:fld id="{D91B805F-FF0F-4BAA-A3A3-E4F945D687F8}" type="datetimeFigureOut">
               <a:rPr lang="en-US" dirty="0"/>
-              <a:t>2/10/2018</a:t>
+              <a:t>2/14/2018</a:t>
             </a:fld>
             <a:endParaRPr lang="en-US" dirty="0"/>
           </a:p>
@@ -1146,7 +2088,7 @@
           <a:p>
             <a:fld id="{780B5C51-60B3-48EF-AA78-DB950F30DBA2}" type="datetimeFigureOut">
               <a:rPr lang="en-US" dirty="0"/>
-              <a:t>2/10/2018</a:t>
+              <a:t>2/14/2018</a:t>
             </a:fld>
             <a:endParaRPr lang="en-US" dirty="0"/>
           </a:p>
@@ -1321,7 +2263,7 @@
           <a:p>
             <a:fld id="{C35D676B-6E73-4E3B-A9B3-4966DB9B52A5}" type="datetimeFigureOut">
               <a:rPr lang="en-US" dirty="0"/>
-              <a:t>2/10/2018</a:t>
+              <a:t>2/14/2018</a:t>
             </a:fld>
             <a:endParaRPr lang="en-US" dirty="0"/>
           </a:p>
@@ -1486,7 +2428,7 @@
           <a:p>
             <a:fld id="{2261F3A6-CC5D-4649-8527-DB0C21FDDFD9}" type="datetimeFigureOut">
               <a:rPr lang="en-US" dirty="0"/>
-              <a:t>2/10/2018</a:t>
+              <a:t>2/14/2018</a:t>
             </a:fld>
             <a:endParaRPr lang="en-US" dirty="0"/>
           </a:p>
@@ -1806,7 +2748,7 @@
           <a:p>
             <a:fld id="{5B6F927C-B73E-4F9D-ADFE-F6E23BD7CEE8}" type="datetimeFigureOut">
               <a:rPr lang="en-US" dirty="0"/>
-              <a:t>2/10/2018</a:t>
+              <a:t>2/14/2018</a:t>
             </a:fld>
             <a:endParaRPr lang="en-US" dirty="0"/>
           </a:p>
@@ -2198,7 +3140,7 @@
           <a:p>
             <a:fld id="{65B1FFFF-984A-4EE5-9BF2-EC9310C878F1}" type="datetimeFigureOut">
               <a:rPr lang="en-US" dirty="0"/>
-              <a:t>2/10/2018</a:t>
+              <a:t>2/14/2018</a:t>
             </a:fld>
             <a:endParaRPr lang="en-US" dirty="0"/>
           </a:p>
@@ -2627,7 +3569,7 @@
           <a:p>
             <a:fld id="{703271C1-B42E-4A60-A25F-0185B888604B}" type="datetimeFigureOut">
               <a:rPr lang="en-US" dirty="0"/>
-              <a:t>2/10/2018</a:t>
+              <a:t>2/14/2018</a:t>
             </a:fld>
             <a:endParaRPr lang="en-US" dirty="0"/>
           </a:p>
@@ -2740,7 +3682,7 @@
           <a:p>
             <a:fld id="{80416292-3725-4763-8973-4C59F0403D99}" type="datetimeFigureOut">
               <a:rPr lang="en-US" dirty="0"/>
-              <a:t>2/10/2018</a:t>
+              <a:t>2/14/2018</a:t>
             </a:fld>
             <a:endParaRPr lang="en-US" dirty="0"/>
           </a:p>
@@ -2830,7 +3772,7 @@
           <a:p>
             <a:fld id="{386996D1-8909-469F-911A-4C12C68BF5D9}" type="datetimeFigureOut">
               <a:rPr lang="en-US" dirty="0"/>
-              <a:t>2/10/2018</a:t>
+              <a:t>2/14/2018</a:t>
             </a:fld>
             <a:endParaRPr lang="en-US" dirty="0"/>
           </a:p>
@@ -3175,7 +4117,7 @@
           <a:p>
             <a:fld id="{E16A73BC-5D11-4675-B334-102E1E8C9B50}" type="datetimeFigureOut">
               <a:rPr lang="en-US" dirty="0"/>
-              <a:t>2/10/2018</a:t>
+              <a:t>2/14/2018</a:t>
             </a:fld>
             <a:endParaRPr lang="en-US" dirty="0"/>
           </a:p>
@@ -3605,7 +4547,7 @@
           <a:p>
             <a:fld id="{27B8E45F-652B-4E89-8925-000B0AB8FD98}" type="datetimeFigureOut">
               <a:rPr lang="en-US" dirty="0"/>
-              <a:t>2/10/2018</a:t>
+              <a:t>2/14/2018</a:t>
             </a:fld>
             <a:endParaRPr lang="en-US" dirty="0"/>
           </a:p>
@@ -3883,7 +4825,7 @@
           <a:p>
             <a:fld id="{C4A3462A-2D5B-48AF-A3D4-EF8A90A50A80}" type="datetimeFigureOut">
               <a:rPr lang="en-US" dirty="0"/>
-              <a:t>2/10/2018</a:t>
+              <a:t>2/14/2018</a:t>
             </a:fld>
             <a:endParaRPr lang="en-US" dirty="0"/>
           </a:p>
@@ -4484,9 +5426,16 @@
             <p:ph type="subTitle" idx="1"/>
           </p:nvPr>
         </p:nvSpPr>
-        <p:spPr/>
-        <p:txBody>
-          <a:bodyPr/>
+        <p:spPr>
+          <a:xfrm>
+            <a:off x="1069848" y="4389120"/>
+            <a:ext cx="7891272" cy="1976956"/>
+          </a:xfrm>
+        </p:spPr>
+        <p:txBody>
+          <a:bodyPr>
+            <a:normAutofit/>
+          </a:bodyPr>
           <a:lstStyle/>
           <a:p>
             <a:r>
@@ -4498,6 +5447,18 @@
             <a:r>
               <a:rPr lang="en-US" dirty="0"/>
               <a:t>By Mark Nielsen</a:t>
+            </a:r>
+          </a:p>
+          <a:p>
+            <a:r>
+              <a:rPr lang="en-US" dirty="0"/>
+              <a:t>Blog: nielsenmark.us</a:t>
+            </a:r>
+          </a:p>
+          <a:p>
+            <a:r>
+              <a:rPr lang="en-US" dirty="0"/>
+              <a:t>GitHub: github.com/nielsenmarkus11</a:t>
             </a:r>
           </a:p>
         </p:txBody>
@@ -4532,147 +5493,40 @@
           <a:chExt cx="0" cy="0"/>
         </a:xfrm>
       </p:grpSpPr>
-      <p:sp>
-        <p:nvSpPr>
-          <p:cNvPr id="2" name="Title 1">
+      <p:pic>
+        <p:nvPicPr>
+          <p:cNvPr id="5" name="Picture 4">
             <a:extLst>
               <a:ext uri="{FF2B5EF4-FFF2-40B4-BE49-F238E27FC236}">
-                <a16:creationId xmlns:a16="http://schemas.microsoft.com/office/drawing/2014/main" id="{D418B701-5117-4E92-AF05-F76E616DB173}"/>
+                <a16:creationId xmlns:a16="http://schemas.microsoft.com/office/drawing/2014/main" id="{6BD7029E-33AC-4B58-93AF-AD58EB99CEDD}"/>
               </a:ext>
             </a:extLst>
           </p:cNvPr>
-          <p:cNvSpPr>
-            <a:spLocks noGrp="1"/>
-          </p:cNvSpPr>
-          <p:nvPr>
-            <p:ph type="title"/>
-          </p:nvPr>
-        </p:nvSpPr>
+          <p:cNvPicPr>
+            <a:picLocks noChangeAspect="1"/>
+          </p:cNvPicPr>
+          <p:nvPr/>
+        </p:nvPicPr>
+        <p:blipFill>
+          <a:blip r:embed="rId2"/>
+          <a:stretch>
+            <a:fillRect/>
+          </a:stretch>
+        </p:blipFill>
         <p:spPr>
           <a:xfrm>
-            <a:off x="1069848" y="484632"/>
-            <a:ext cx="10058400" cy="651710"/>
+            <a:off x="2051586" y="166262"/>
+            <a:ext cx="8088827" cy="6691738"/>
           </a:xfrm>
+          <a:prstGeom prst="rect">
+            <a:avLst/>
+          </a:prstGeom>
         </p:spPr>
-        <p:txBody>
-          <a:bodyPr>
-            <a:normAutofit fontScale="90000"/>
-          </a:bodyPr>
-          <a:lstStyle/>
-          <a:p>
-            <a:r>
-              <a:rPr lang="en-US" dirty="0"/>
-              <a:t>Where to start?</a:t>
-            </a:r>
-          </a:p>
-        </p:txBody>
-      </p:sp>
-      <p:sp>
-        <p:nvSpPr>
-          <p:cNvPr id="3" name="Content Placeholder 2">
-            <a:extLst>
-              <a:ext uri="{FF2B5EF4-FFF2-40B4-BE49-F238E27FC236}">
-                <a16:creationId xmlns:a16="http://schemas.microsoft.com/office/drawing/2014/main" id="{56AA0D83-A851-4695-ADDB-F263ADD2614D}"/>
-              </a:ext>
-            </a:extLst>
-          </p:cNvPr>
-          <p:cNvSpPr>
-            <a:spLocks noGrp="1"/>
-          </p:cNvSpPr>
-          <p:nvPr>
-            <p:ph idx="1"/>
-          </p:nvPr>
-        </p:nvSpPr>
-        <p:spPr>
-          <a:xfrm>
-            <a:off x="1069848" y="1337779"/>
-            <a:ext cx="10058400" cy="5035858"/>
-          </a:xfrm>
-        </p:spPr>
-        <p:txBody>
-          <a:bodyPr>
-            <a:normAutofit/>
-          </a:bodyPr>
-          <a:lstStyle/>
-          <a:p>
-            <a:pPr>
-              <a:buFont typeface="Arial" panose="020B0604020202020204" pitchFamily="34" charset="0"/>
-              <a:buChar char="•"/>
-            </a:pPr>
-            <a:r>
-              <a:rPr lang="en-US" sz="2400" dirty="0" err="1"/>
-              <a:t>FutureLearn</a:t>
-            </a:r>
-            <a:r>
-              <a:rPr lang="en-US" sz="2400" dirty="0"/>
-              <a:t> Forecasting MOOC: </a:t>
-            </a:r>
-          </a:p>
-          <a:p>
-            <a:pPr lvl="1">
-              <a:buFont typeface="Arial" panose="020B0604020202020204" pitchFamily="34" charset="0"/>
-              <a:buChar char="•"/>
-            </a:pPr>
-            <a:r>
-              <a:rPr lang="en-US" sz="2400" dirty="0">
-                <a:hlinkClick r:id="rId2"/>
-              </a:rPr>
-              <a:t>https://www.futurelearn.com/courses/business-analytics-forecasting</a:t>
-            </a:r>
-            <a:endParaRPr lang="en-US" sz="2400" dirty="0"/>
-          </a:p>
-          <a:p>
-            <a:pPr>
-              <a:buFont typeface="Arial" panose="020B0604020202020204" pitchFamily="34" charset="0"/>
-              <a:buChar char="•"/>
-            </a:pPr>
-            <a:r>
-              <a:rPr lang="en-US" sz="2400" dirty="0"/>
-              <a:t>Forecasting: Principles and Practice:</a:t>
-            </a:r>
-          </a:p>
-          <a:p>
-            <a:pPr lvl="1">
-              <a:buFont typeface="Arial" panose="020B0604020202020204" pitchFamily="34" charset="0"/>
-              <a:buChar char="•"/>
-            </a:pPr>
-            <a:r>
-              <a:rPr lang="en-US" sz="2400" dirty="0">
-                <a:hlinkClick r:id="rId3"/>
-              </a:rPr>
-              <a:t>http://otexts.org/fpp/</a:t>
-            </a:r>
-            <a:endParaRPr lang="en-US" sz="2400" dirty="0"/>
-          </a:p>
-          <a:p>
-            <a:pPr>
-              <a:buFont typeface="Arial" panose="020B0604020202020204" pitchFamily="34" charset="0"/>
-              <a:buChar char="•"/>
-            </a:pPr>
-            <a:r>
-              <a:rPr lang="en-US" sz="2400" dirty="0"/>
-              <a:t>Prophet: Forecasting at Scale:</a:t>
-            </a:r>
-          </a:p>
-          <a:p>
-            <a:pPr lvl="1">
-              <a:buFont typeface="Arial" panose="020B0604020202020204" pitchFamily="34" charset="0"/>
-              <a:buChar char="•"/>
-            </a:pPr>
-            <a:r>
-              <a:rPr lang="en-US" sz="2400" dirty="0">
-                <a:hlinkClick r:id="rId4"/>
-              </a:rPr>
-              <a:t>https://facebook.github.io/prophet/</a:t>
-            </a:r>
-            <a:endParaRPr lang="en-US" sz="2400" dirty="0"/>
-          </a:p>
-        </p:txBody>
-      </p:sp>
+      </p:pic>
     </p:spTree>
     <p:extLst>
       <p:ext uri="{BB962C8B-B14F-4D97-AF65-F5344CB8AC3E}">
-        <p14:creationId xmlns:p14="http://schemas.microsoft.com/office/powerpoint/2010/main" val="3430394307"/>
+        <p14:creationId xmlns:p14="http://schemas.microsoft.com/office/powerpoint/2010/main" val="1080001726"/>
       </p:ext>
     </p:extLst>
   </p:cSld>
@@ -4729,6 +5583,173 @@
           <a:p>
             <a:r>
               <a:rPr lang="en-US" dirty="0"/>
+              <a:t>Where to start?</a:t>
+            </a:r>
+          </a:p>
+        </p:txBody>
+      </p:sp>
+      <p:sp>
+        <p:nvSpPr>
+          <p:cNvPr id="3" name="Content Placeholder 2">
+            <a:extLst>
+              <a:ext uri="{FF2B5EF4-FFF2-40B4-BE49-F238E27FC236}">
+                <a16:creationId xmlns:a16="http://schemas.microsoft.com/office/drawing/2014/main" id="{56AA0D83-A851-4695-ADDB-F263ADD2614D}"/>
+              </a:ext>
+            </a:extLst>
+          </p:cNvPr>
+          <p:cNvSpPr>
+            <a:spLocks noGrp="1"/>
+          </p:cNvSpPr>
+          <p:nvPr>
+            <p:ph idx="1"/>
+          </p:nvPr>
+        </p:nvSpPr>
+        <p:spPr>
+          <a:xfrm>
+            <a:off x="1069848" y="1337779"/>
+            <a:ext cx="10058400" cy="5035858"/>
+          </a:xfrm>
+        </p:spPr>
+        <p:txBody>
+          <a:bodyPr>
+            <a:normAutofit/>
+          </a:bodyPr>
+          <a:lstStyle/>
+          <a:p>
+            <a:pPr>
+              <a:buFont typeface="Arial" panose="020B0604020202020204" pitchFamily="34" charset="0"/>
+              <a:buChar char="•"/>
+            </a:pPr>
+            <a:r>
+              <a:rPr lang="en-US" sz="2400" dirty="0" err="1"/>
+              <a:t>FutureLearn</a:t>
+            </a:r>
+            <a:r>
+              <a:rPr lang="en-US" sz="2400" dirty="0"/>
+              <a:t> Forecasting MOOC: </a:t>
+            </a:r>
+          </a:p>
+          <a:p>
+            <a:pPr lvl="1">
+              <a:buFont typeface="Arial" panose="020B0604020202020204" pitchFamily="34" charset="0"/>
+              <a:buChar char="•"/>
+            </a:pPr>
+            <a:r>
+              <a:rPr lang="en-US" sz="2400" dirty="0">
+                <a:hlinkClick r:id="rId3"/>
+              </a:rPr>
+              <a:t>https://www.futurelearn.com/courses/business-analytics-forecasting</a:t>
+            </a:r>
+            <a:endParaRPr lang="en-US" sz="2400" dirty="0"/>
+          </a:p>
+          <a:p>
+            <a:pPr>
+              <a:buFont typeface="Arial" panose="020B0604020202020204" pitchFamily="34" charset="0"/>
+              <a:buChar char="•"/>
+            </a:pPr>
+            <a:r>
+              <a:rPr lang="en-US" sz="2400" dirty="0"/>
+              <a:t>Forecasting: Principles and Practice:</a:t>
+            </a:r>
+          </a:p>
+          <a:p>
+            <a:pPr lvl="1">
+              <a:buFont typeface="Arial" panose="020B0604020202020204" pitchFamily="34" charset="0"/>
+              <a:buChar char="•"/>
+            </a:pPr>
+            <a:r>
+              <a:rPr lang="en-US" sz="2400" dirty="0">
+                <a:hlinkClick r:id="rId4"/>
+              </a:rPr>
+              <a:t>http://otexts.org/fpp/</a:t>
+            </a:r>
+            <a:endParaRPr lang="en-US" sz="2400" dirty="0"/>
+          </a:p>
+          <a:p>
+            <a:pPr>
+              <a:buFont typeface="Arial" panose="020B0604020202020204" pitchFamily="34" charset="0"/>
+              <a:buChar char="•"/>
+            </a:pPr>
+            <a:r>
+              <a:rPr lang="en-US" sz="2400" dirty="0"/>
+              <a:t>Prophet: Forecasting at Scale:</a:t>
+            </a:r>
+          </a:p>
+          <a:p>
+            <a:pPr lvl="1">
+              <a:buFont typeface="Arial" panose="020B0604020202020204" pitchFamily="34" charset="0"/>
+              <a:buChar char="•"/>
+            </a:pPr>
+            <a:r>
+              <a:rPr lang="en-US" sz="2400" dirty="0">
+                <a:hlinkClick r:id="rId5"/>
+              </a:rPr>
+              <a:t>https://facebook.github.io/prophet/</a:t>
+            </a:r>
+            <a:endParaRPr lang="en-US" sz="2400" dirty="0"/>
+          </a:p>
+        </p:txBody>
+      </p:sp>
+    </p:spTree>
+    <p:extLst>
+      <p:ext uri="{BB962C8B-B14F-4D97-AF65-F5344CB8AC3E}">
+        <p14:creationId xmlns:p14="http://schemas.microsoft.com/office/powerpoint/2010/main" val="3430394307"/>
+      </p:ext>
+    </p:extLst>
+  </p:cSld>
+  <p:clrMapOvr>
+    <a:masterClrMapping/>
+  </p:clrMapOvr>
+</p:sld>
+</file>
+
+<file path=ppt/slides/slide12.xml><?xml version="1.0" encoding="utf-8"?>
+<p:sld xmlns:a="http://schemas.openxmlformats.org/drawingml/2006/main" xmlns:r="http://schemas.openxmlformats.org/officeDocument/2006/relationships" xmlns:p="http://schemas.openxmlformats.org/presentationml/2006/main">
+  <p:cSld>
+    <p:spTree>
+      <p:nvGrpSpPr>
+        <p:cNvPr id="1" name=""/>
+        <p:cNvGrpSpPr/>
+        <p:nvPr/>
+      </p:nvGrpSpPr>
+      <p:grpSpPr>
+        <a:xfrm>
+          <a:off x="0" y="0"/>
+          <a:ext cx="0" cy="0"/>
+          <a:chOff x="0" y="0"/>
+          <a:chExt cx="0" cy="0"/>
+        </a:xfrm>
+      </p:grpSpPr>
+      <p:sp>
+        <p:nvSpPr>
+          <p:cNvPr id="2" name="Title 1">
+            <a:extLst>
+              <a:ext uri="{FF2B5EF4-FFF2-40B4-BE49-F238E27FC236}">
+                <a16:creationId xmlns:a16="http://schemas.microsoft.com/office/drawing/2014/main" id="{D418B701-5117-4E92-AF05-F76E616DB173}"/>
+              </a:ext>
+            </a:extLst>
+          </p:cNvPr>
+          <p:cNvSpPr>
+            <a:spLocks noGrp="1"/>
+          </p:cNvSpPr>
+          <p:nvPr>
+            <p:ph type="title"/>
+          </p:nvPr>
+        </p:nvSpPr>
+        <p:spPr>
+          <a:xfrm>
+            <a:off x="1069848" y="484632"/>
+            <a:ext cx="10058400" cy="651710"/>
+          </a:xfrm>
+        </p:spPr>
+        <p:txBody>
+          <a:bodyPr>
+            <a:normAutofit fontScale="90000"/>
+          </a:bodyPr>
+          <a:lstStyle/>
+          <a:p>
+            <a:r>
+              <a:rPr lang="en-US" dirty="0"/>
               <a:t>References</a:t>
             </a:r>
           </a:p>
@@ -4920,7 +5941,7 @@
 </p:sld>
 </file>
 
-<file path=ppt/slides/slide12.xml><?xml version="1.0" encoding="utf-8"?>
+<file path=ppt/slides/slide13.xml><?xml version="1.0" encoding="utf-8"?>
 <p:sld xmlns:a="http://schemas.openxmlformats.org/drawingml/2006/main" xmlns:r="http://schemas.openxmlformats.org/officeDocument/2006/relationships" xmlns:p="http://schemas.openxmlformats.org/presentationml/2006/main">
   <p:cSld>
     <p:spTree>
@@ -5022,170 +6043,6 @@
       </p:grpSpPr>
       <p:sp>
         <p:nvSpPr>
-          <p:cNvPr id="4" name="Title 3">
-            <a:extLst>
-              <a:ext uri="{FF2B5EF4-FFF2-40B4-BE49-F238E27FC236}">
-                <a16:creationId xmlns:a16="http://schemas.microsoft.com/office/drawing/2014/main" id="{77370BC7-52CF-4E4D-B153-03802F41E215}"/>
-              </a:ext>
-            </a:extLst>
-          </p:cNvPr>
-          <p:cNvSpPr>
-            <a:spLocks noGrp="1"/>
-          </p:cNvSpPr>
-          <p:nvPr>
-            <p:ph type="title"/>
-          </p:nvPr>
-        </p:nvSpPr>
-        <p:spPr/>
-        <p:txBody>
-          <a:bodyPr/>
-          <a:lstStyle/>
-          <a:p>
-            <a:r>
-              <a:rPr lang="en-US" dirty="0"/>
-              <a:t>Air Quality and Weather Data</a:t>
-            </a:r>
-          </a:p>
-        </p:txBody>
-      </p:sp>
-      <p:pic>
-        <p:nvPicPr>
-          <p:cNvPr id="8" name="Picture Placeholder 7">
-            <a:extLst>
-              <a:ext uri="{FF2B5EF4-FFF2-40B4-BE49-F238E27FC236}">
-                <a16:creationId xmlns:a16="http://schemas.microsoft.com/office/drawing/2014/main" id="{245E3CF8-00A1-433A-9508-551E07E0387E}"/>
-              </a:ext>
-            </a:extLst>
-          </p:cNvPr>
-          <p:cNvPicPr>
-            <a:picLocks noGrp="1" noChangeAspect="1"/>
-          </p:cNvPicPr>
-          <p:nvPr>
-            <p:ph type="pic" idx="1"/>
-          </p:nvPr>
-        </p:nvPicPr>
-        <p:blipFill>
-          <a:blip r:embed="rId2"/>
-          <a:srcRect l="4835" r="4835"/>
-          <a:stretch>
-            <a:fillRect/>
-          </a:stretch>
-        </p:blipFill>
-        <p:spPr>
-          <a:prstGeom prst="rect">
-            <a:avLst/>
-          </a:prstGeom>
-        </p:spPr>
-      </p:pic>
-      <p:sp>
-        <p:nvSpPr>
-          <p:cNvPr id="6" name="Text Placeholder 5">
-            <a:extLst>
-              <a:ext uri="{FF2B5EF4-FFF2-40B4-BE49-F238E27FC236}">
-                <a16:creationId xmlns:a16="http://schemas.microsoft.com/office/drawing/2014/main" id="{FAFD13CE-9ACC-4BB7-AB3F-935A4AE2444B}"/>
-              </a:ext>
-            </a:extLst>
-          </p:cNvPr>
-          <p:cNvSpPr>
-            <a:spLocks noGrp="1"/>
-          </p:cNvSpPr>
-          <p:nvPr>
-            <p:ph type="body" sz="half" idx="2"/>
-          </p:nvPr>
-        </p:nvSpPr>
-        <p:spPr/>
-        <p:txBody>
-          <a:bodyPr>
-            <a:normAutofit/>
-          </a:bodyPr>
-          <a:lstStyle/>
-          <a:p>
-            <a:pPr marL="342900" indent="-342900">
-              <a:buFont typeface="Arial" panose="020B0604020202020204" pitchFamily="34" charset="0"/>
-              <a:buChar char="•"/>
-            </a:pPr>
-            <a:r>
-              <a:rPr lang="en-US" sz="2000" dirty="0"/>
-              <a:t>Daily PM 2.5 </a:t>
-            </a:r>
-          </a:p>
-          <a:p>
-            <a:pPr marL="342900" indent="-342900">
-              <a:buFont typeface="Arial" panose="020B0604020202020204" pitchFamily="34" charset="0"/>
-              <a:buChar char="•"/>
-            </a:pPr>
-            <a:r>
-              <a:rPr lang="en-US" sz="2000" dirty="0"/>
-              <a:t>Inversion (Valley - Peak Temperature)</a:t>
-            </a:r>
-          </a:p>
-          <a:p>
-            <a:pPr marL="342900" indent="-342900">
-              <a:buFont typeface="Arial" panose="020B0604020202020204" pitchFamily="34" charset="0"/>
-              <a:buChar char="•"/>
-            </a:pPr>
-            <a:r>
-              <a:rPr lang="en-US" sz="2000" dirty="0"/>
-              <a:t>Wind Speed</a:t>
-            </a:r>
-          </a:p>
-          <a:p>
-            <a:pPr marL="342900" indent="-342900">
-              <a:buFont typeface="Arial" panose="020B0604020202020204" pitchFamily="34" charset="0"/>
-              <a:buChar char="•"/>
-            </a:pPr>
-            <a:r>
-              <a:rPr lang="en-US" sz="2000" dirty="0"/>
-              <a:t>Precipitation</a:t>
-            </a:r>
-          </a:p>
-          <a:p>
-            <a:pPr marL="342900" indent="-342900">
-              <a:buFont typeface="Arial" panose="020B0604020202020204" pitchFamily="34" charset="0"/>
-              <a:buChar char="•"/>
-            </a:pPr>
-            <a:r>
-              <a:rPr lang="en-US" sz="2000" dirty="0"/>
-              <a:t>Firework Holidays</a:t>
-            </a:r>
-          </a:p>
-          <a:p>
-            <a:endParaRPr lang="en-US" sz="2000" dirty="0"/>
-          </a:p>
-        </p:txBody>
-      </p:sp>
-    </p:spTree>
-    <p:extLst>
-      <p:ext uri="{BB962C8B-B14F-4D97-AF65-F5344CB8AC3E}">
-        <p14:creationId xmlns:p14="http://schemas.microsoft.com/office/powerpoint/2010/main" val="282768226"/>
-      </p:ext>
-    </p:extLst>
-  </p:cSld>
-  <p:clrMapOvr>
-    <a:masterClrMapping/>
-  </p:clrMapOvr>
-</p:sld>
-</file>
-
-<file path=ppt/slides/slide3.xml><?xml version="1.0" encoding="utf-8"?>
-<p:sld xmlns:a="http://schemas.openxmlformats.org/drawingml/2006/main" xmlns:r="http://schemas.openxmlformats.org/officeDocument/2006/relationships" xmlns:p="http://schemas.openxmlformats.org/presentationml/2006/main">
-  <p:cSld>
-    <p:spTree>
-      <p:nvGrpSpPr>
-        <p:cNvPr id="1" name=""/>
-        <p:cNvGrpSpPr/>
-        <p:nvPr/>
-      </p:nvGrpSpPr>
-      <p:grpSpPr>
-        <a:xfrm>
-          <a:off x="0" y="0"/>
-          <a:ext cx="0" cy="0"/>
-          <a:chOff x="0" y="0"/>
-          <a:chExt cx="0" cy="0"/>
-        </a:xfrm>
-      </p:grpSpPr>
-      <p:sp>
-        <p:nvSpPr>
           <p:cNvPr id="2" name="Title 1">
             <a:extLst>
               <a:ext uri="{FF2B5EF4-FFF2-40B4-BE49-F238E27FC236}">
@@ -5240,8 +6097,8 @@
           </a:p>
         </p:txBody>
       </p:sp>
-      <mc:AlternateContent xmlns:mc="http://schemas.openxmlformats.org/markup-compatibility/2006">
-        <mc:Choice xmlns:a14="http://schemas.microsoft.com/office/drawing/2010/main" Requires="a14">
+      <mc:AlternateContent xmlns:mc="http://schemas.openxmlformats.org/markup-compatibility/2006" xmlns:a14="http://schemas.microsoft.com/office/drawing/2010/main">
+        <mc:Choice Requires="a14">
           <p:sp>
             <p:nvSpPr>
               <p:cNvPr id="5" name="Content Placeholder 4">
@@ -5418,8 +6275,13 @@
                 </a:pPr>
                 <a:r>
                   <a:rPr lang="en-US" sz="2400" dirty="0"/>
-                  <a:t>Change points</a:t>
+                  <a:t>Shifts </a:t>
                 </a:r>
+                <a:r>
+                  <a:rPr lang="en-US" sz="2400"/>
+                  <a:t>in Trends</a:t>
+                </a:r>
+                <a:endParaRPr lang="en-US" sz="2400" dirty="0"/>
               </a:p>
               <a:p>
                 <a:pPr>
@@ -5450,7 +6312,7 @@
             </p:txBody>
           </p:sp>
         </mc:Choice>
-        <mc:Fallback>
+        <mc:Fallback xmlns="">
           <p:sp>
             <p:nvSpPr>
               <p:cNvPr id="5" name="Content Placeholder 4">
@@ -5469,7 +6331,7 @@
             </p:nvSpPr>
             <p:spPr>
               <a:blipFill>
-                <a:blip r:embed="rId2"/>
+                <a:blip r:embed="rId3"/>
                 <a:stretch>
                   <a:fillRect l="-1026" b="-741"/>
                 </a:stretch>
@@ -5518,8 +6380,8 @@
           </a:p>
         </p:txBody>
       </p:sp>
-      <mc:AlternateContent xmlns:mc="http://schemas.openxmlformats.org/markup-compatibility/2006">
-        <mc:Choice xmlns:a14="http://schemas.microsoft.com/office/drawing/2010/main" Requires="a14">
+      <mc:AlternateContent xmlns:mc="http://schemas.openxmlformats.org/markup-compatibility/2006" xmlns:a14="http://schemas.microsoft.com/office/drawing/2010/main">
+        <mc:Choice Requires="a14">
           <p:sp>
             <p:nvSpPr>
               <p:cNvPr id="7" name="Content Placeholder 6">
@@ -5739,7 +6601,7 @@
             </p:txBody>
           </p:sp>
         </mc:Choice>
-        <mc:Fallback>
+        <mc:Fallback xmlns="">
           <p:sp>
             <p:nvSpPr>
               <p:cNvPr id="7" name="Content Placeholder 6">
@@ -5758,7 +6620,7 @@
             </p:nvSpPr>
             <p:spPr>
               <a:blipFill>
-                <a:blip r:embed="rId3"/>
+                <a:blip r:embed="rId4"/>
                 <a:stretch>
                   <a:fillRect l="-897" r="-3077"/>
                 </a:stretch>
@@ -5792,6 +6654,213 @@
 </p:sld>
 </file>
 
+<file path=ppt/slides/slide3.xml><?xml version="1.0" encoding="utf-8"?>
+<p:sld xmlns:a="http://schemas.openxmlformats.org/drawingml/2006/main" xmlns:r="http://schemas.openxmlformats.org/officeDocument/2006/relationships" xmlns:p="http://schemas.openxmlformats.org/presentationml/2006/main">
+  <p:cSld>
+    <p:spTree>
+      <p:nvGrpSpPr>
+        <p:cNvPr id="1" name=""/>
+        <p:cNvGrpSpPr/>
+        <p:nvPr/>
+      </p:nvGrpSpPr>
+      <p:grpSpPr>
+        <a:xfrm>
+          <a:off x="0" y="0"/>
+          <a:ext cx="0" cy="0"/>
+          <a:chOff x="0" y="0"/>
+          <a:chExt cx="0" cy="0"/>
+        </a:xfrm>
+      </p:grpSpPr>
+      <p:sp>
+        <p:nvSpPr>
+          <p:cNvPr id="2" name="Title 1">
+            <a:extLst>
+              <a:ext uri="{FF2B5EF4-FFF2-40B4-BE49-F238E27FC236}">
+                <a16:creationId xmlns:a16="http://schemas.microsoft.com/office/drawing/2014/main" id="{CC00D259-2249-4879-A6EC-A295A437C0DA}"/>
+              </a:ext>
+            </a:extLst>
+          </p:cNvPr>
+          <p:cNvSpPr>
+            <a:spLocks noGrp="1"/>
+          </p:cNvSpPr>
+          <p:nvPr>
+            <p:ph type="title"/>
+          </p:nvPr>
+        </p:nvSpPr>
+        <p:spPr/>
+        <p:txBody>
+          <a:bodyPr/>
+          <a:lstStyle/>
+          <a:p>
+            <a:r>
+              <a:rPr lang="en-US" dirty="0"/>
+              <a:t>Time Series Examples</a:t>
+            </a:r>
+          </a:p>
+        </p:txBody>
+      </p:sp>
+      <p:sp>
+        <p:nvSpPr>
+          <p:cNvPr id="9" name="Content Placeholder 8">
+            <a:extLst>
+              <a:ext uri="{FF2B5EF4-FFF2-40B4-BE49-F238E27FC236}">
+                <a16:creationId xmlns:a16="http://schemas.microsoft.com/office/drawing/2014/main" id="{6FA2D59F-CDAF-498F-AB24-2A9A24873690}"/>
+              </a:ext>
+            </a:extLst>
+          </p:cNvPr>
+          <p:cNvSpPr>
+            <a:spLocks noGrp="1"/>
+          </p:cNvSpPr>
+          <p:nvPr>
+            <p:ph sz="half" idx="1"/>
+          </p:nvPr>
+        </p:nvSpPr>
+        <p:spPr/>
+        <p:txBody>
+          <a:bodyPr>
+            <a:normAutofit/>
+          </a:bodyPr>
+          <a:lstStyle/>
+          <a:p>
+            <a:r>
+              <a:rPr lang="en-US" sz="2800" dirty="0"/>
+              <a:t>Financial</a:t>
+            </a:r>
+          </a:p>
+          <a:p>
+            <a:pPr lvl="1"/>
+            <a:r>
+              <a:rPr lang="en-US" sz="2400" dirty="0"/>
+              <a:t>Stock Market Pricing Index</a:t>
+            </a:r>
+          </a:p>
+          <a:p>
+            <a:pPr lvl="1"/>
+            <a:r>
+              <a:rPr lang="en-US" sz="2400" dirty="0"/>
+              <a:t>Reserve Planning</a:t>
+            </a:r>
+          </a:p>
+          <a:p>
+            <a:r>
+              <a:rPr lang="en-US" sz="2800" dirty="0"/>
+              <a:t>Health Care</a:t>
+            </a:r>
+          </a:p>
+          <a:p>
+            <a:pPr lvl="1"/>
+            <a:r>
+              <a:rPr lang="en-US" sz="2400" dirty="0"/>
+              <a:t>ER visits forecast</a:t>
+            </a:r>
+          </a:p>
+          <a:p>
+            <a:pPr lvl="1"/>
+            <a:r>
+              <a:rPr lang="en-US" sz="2400" dirty="0"/>
+              <a:t>Staffing</a:t>
+            </a:r>
+          </a:p>
+          <a:p>
+            <a:pPr lvl="1"/>
+            <a:r>
+              <a:rPr lang="en-US" sz="2400" dirty="0"/>
+              <a:t>Total Medical Expense</a:t>
+            </a:r>
+          </a:p>
+          <a:p>
+            <a:pPr lvl="1"/>
+            <a:endParaRPr lang="en-US" sz="2400" dirty="0"/>
+          </a:p>
+        </p:txBody>
+      </p:sp>
+      <p:sp>
+        <p:nvSpPr>
+          <p:cNvPr id="10" name="Content Placeholder 9">
+            <a:extLst>
+              <a:ext uri="{FF2B5EF4-FFF2-40B4-BE49-F238E27FC236}">
+                <a16:creationId xmlns:a16="http://schemas.microsoft.com/office/drawing/2014/main" id="{B56CA419-D2BB-457F-A21B-E77AFA81012B}"/>
+              </a:ext>
+            </a:extLst>
+          </p:cNvPr>
+          <p:cNvSpPr>
+            <a:spLocks noGrp="1"/>
+          </p:cNvSpPr>
+          <p:nvPr>
+            <p:ph sz="half" idx="2"/>
+          </p:nvPr>
+        </p:nvSpPr>
+        <p:spPr/>
+        <p:txBody>
+          <a:bodyPr>
+            <a:normAutofit/>
+          </a:bodyPr>
+          <a:lstStyle/>
+          <a:p>
+            <a:r>
+              <a:rPr lang="en-US" sz="2800" dirty="0"/>
+              <a:t>Social</a:t>
+            </a:r>
+          </a:p>
+          <a:p>
+            <a:pPr lvl="1"/>
+            <a:r>
+              <a:rPr lang="en-US" sz="2400" dirty="0"/>
+              <a:t>Tweet, post, etc. trends</a:t>
+            </a:r>
+          </a:p>
+          <a:p>
+            <a:pPr lvl="1"/>
+            <a:r>
+              <a:rPr lang="en-US" sz="2400" dirty="0"/>
+              <a:t>Bike share forecasting</a:t>
+            </a:r>
+          </a:p>
+          <a:p>
+            <a:r>
+              <a:rPr lang="en-US" sz="2800" dirty="0"/>
+              <a:t>Environmental</a:t>
+            </a:r>
+          </a:p>
+          <a:p>
+            <a:pPr lvl="1"/>
+            <a:r>
+              <a:rPr lang="en-US" sz="2400" dirty="0"/>
+              <a:t>Weather forecasts</a:t>
+            </a:r>
+          </a:p>
+          <a:p>
+            <a:pPr lvl="1"/>
+            <a:r>
+              <a:rPr lang="en-US" sz="2400" dirty="0"/>
+              <a:t>Pollution</a:t>
+            </a:r>
+          </a:p>
+          <a:p>
+            <a:r>
+              <a:rPr lang="en-US" sz="2800" dirty="0"/>
+              <a:t>Etc.</a:t>
+            </a:r>
+          </a:p>
+          <a:p>
+            <a:pPr lvl="1"/>
+            <a:endParaRPr lang="en-US" sz="2400" dirty="0"/>
+          </a:p>
+        </p:txBody>
+      </p:sp>
+    </p:spTree>
+    <p:extLst>
+      <p:ext uri="{BB962C8B-B14F-4D97-AF65-F5344CB8AC3E}">
+        <p14:creationId xmlns:p14="http://schemas.microsoft.com/office/powerpoint/2010/main" val="3284285449"/>
+      </p:ext>
+    </p:extLst>
+  </p:cSld>
+  <p:clrMapOvr>
+    <a:masterClrMapping/>
+  </p:clrMapOvr>
+</p:sld>
+</file>
+
 <file path=ppt/slides/slide4.xml><?xml version="1.0" encoding="utf-8"?>
 <p:sld xmlns:a="http://schemas.openxmlformats.org/drawingml/2006/main" xmlns:r="http://schemas.openxmlformats.org/officeDocument/2006/relationships" xmlns:p="http://schemas.openxmlformats.org/presentationml/2006/main">
   <p:cSld>
@@ -5811,10 +6880,10 @@
       </p:grpSpPr>
       <p:sp>
         <p:nvSpPr>
-          <p:cNvPr id="7" name="Title 6">
+          <p:cNvPr id="4" name="Title 3">
             <a:extLst>
               <a:ext uri="{FF2B5EF4-FFF2-40B4-BE49-F238E27FC236}">
-                <a16:creationId xmlns:a16="http://schemas.microsoft.com/office/drawing/2014/main" id="{0F212CC8-757B-4DA1-875B-E1CEAFD4E313}"/>
+                <a16:creationId xmlns:a16="http://schemas.microsoft.com/office/drawing/2014/main" id="{77370BC7-52CF-4E4D-B153-03802F41E215}"/>
               </a:ext>
             </a:extLst>
           </p:cNvPr>
@@ -5832,40 +6901,121 @@
           <a:p>
             <a:r>
               <a:rPr lang="en-US" dirty="0"/>
-              <a:t>Modeling Demo in R</a:t>
-            </a:r>
-          </a:p>
-        </p:txBody>
-      </p:sp>
-      <p:sp>
-        <p:nvSpPr>
-          <p:cNvPr id="8" name="Text Placeholder 7">
+              <a:t>Air Quality and Weather Data</a:t>
+            </a:r>
+          </a:p>
+        </p:txBody>
+      </p:sp>
+      <p:pic>
+        <p:nvPicPr>
+          <p:cNvPr id="8" name="Picture Placeholder 7">
             <a:extLst>
               <a:ext uri="{FF2B5EF4-FFF2-40B4-BE49-F238E27FC236}">
-                <a16:creationId xmlns:a16="http://schemas.microsoft.com/office/drawing/2014/main" id="{72EC659C-73E4-4391-8E78-9319018FAD14}"/>
+                <a16:creationId xmlns:a16="http://schemas.microsoft.com/office/drawing/2014/main" id="{245E3CF8-00A1-433A-9508-551E07E0387E}"/>
               </a:ext>
             </a:extLst>
           </p:cNvPr>
-          <p:cNvSpPr>
-            <a:spLocks noGrp="1"/>
-          </p:cNvSpPr>
-          <p:nvPr>
-            <p:ph type="body" idx="1"/>
+          <p:cNvPicPr>
+            <a:picLocks noGrp="1" noChangeAspect="1"/>
+          </p:cNvPicPr>
+          <p:nvPr>
+            <p:ph type="pic" idx="1"/>
+          </p:nvPr>
+        </p:nvPicPr>
+        <p:blipFill>
+          <a:blip r:embed="rId3"/>
+          <a:srcRect l="4835" r="4835"/>
+          <a:stretch>
+            <a:fillRect/>
+          </a:stretch>
+        </p:blipFill>
+        <p:spPr>
+          <a:prstGeom prst="rect">
+            <a:avLst/>
+          </a:prstGeom>
+        </p:spPr>
+      </p:pic>
+      <p:sp>
+        <p:nvSpPr>
+          <p:cNvPr id="6" name="Text Placeholder 5">
+            <a:extLst>
+              <a:ext uri="{FF2B5EF4-FFF2-40B4-BE49-F238E27FC236}">
+                <a16:creationId xmlns:a16="http://schemas.microsoft.com/office/drawing/2014/main" id="{FAFD13CE-9ACC-4BB7-AB3F-935A4AE2444B}"/>
+              </a:ext>
+            </a:extLst>
+          </p:cNvPr>
+          <p:cNvSpPr>
+            <a:spLocks noGrp="1"/>
+          </p:cNvSpPr>
+          <p:nvPr>
+            <p:ph type="body" sz="half" idx="2"/>
           </p:nvPr>
         </p:nvSpPr>
         <p:spPr/>
         <p:txBody>
-          <a:bodyPr/>
+          <a:bodyPr>
+            <a:normAutofit/>
+          </a:bodyPr>
           <a:lstStyle/>
           <a:p>
-            <a:endParaRPr lang="en-US" dirty="0"/>
+            <a:pPr marL="342900" indent="-342900">
+              <a:buFont typeface="Arial" panose="020B0604020202020204" pitchFamily="34" charset="0"/>
+              <a:buChar char="•"/>
+            </a:pPr>
+            <a:r>
+              <a:rPr lang="en-US" sz="2000" dirty="0"/>
+              <a:t>Daily PM 2.5 </a:t>
+            </a:r>
+          </a:p>
+          <a:p>
+            <a:pPr marL="342900" indent="-342900">
+              <a:buFont typeface="Arial" panose="020B0604020202020204" pitchFamily="34" charset="0"/>
+              <a:buChar char="•"/>
+            </a:pPr>
+            <a:r>
+              <a:rPr lang="en-US" sz="2000" dirty="0"/>
+              <a:t>Inversion (Valley - Peak Temperature)</a:t>
+            </a:r>
+          </a:p>
+          <a:p>
+            <a:pPr marL="342900" indent="-342900">
+              <a:buFont typeface="Arial" panose="020B0604020202020204" pitchFamily="34" charset="0"/>
+              <a:buChar char="•"/>
+            </a:pPr>
+            <a:r>
+              <a:rPr lang="en-US" sz="2000" dirty="0"/>
+              <a:t>Wind Speed</a:t>
+            </a:r>
+          </a:p>
+          <a:p>
+            <a:pPr marL="342900" indent="-342900">
+              <a:buFont typeface="Arial" panose="020B0604020202020204" pitchFamily="34" charset="0"/>
+              <a:buChar char="•"/>
+            </a:pPr>
+            <a:r>
+              <a:rPr lang="en-US" sz="2000" dirty="0"/>
+              <a:t>Precipitation</a:t>
+            </a:r>
+          </a:p>
+          <a:p>
+            <a:pPr marL="342900" indent="-342900">
+              <a:buFont typeface="Arial" panose="020B0604020202020204" pitchFamily="34" charset="0"/>
+              <a:buChar char="•"/>
+            </a:pPr>
+            <a:r>
+              <a:rPr lang="en-US" sz="2000" dirty="0"/>
+              <a:t>Firework Holidays</a:t>
+            </a:r>
+          </a:p>
+          <a:p>
+            <a:endParaRPr lang="en-US" sz="2000" dirty="0"/>
           </a:p>
         </p:txBody>
       </p:sp>
     </p:spTree>
     <p:extLst>
       <p:ext uri="{BB962C8B-B14F-4D97-AF65-F5344CB8AC3E}">
-        <p14:creationId xmlns:p14="http://schemas.microsoft.com/office/powerpoint/2010/main" val="1615024739"/>
+        <p14:creationId xmlns:p14="http://schemas.microsoft.com/office/powerpoint/2010/main" val="282768226"/>
       </p:ext>
     </p:extLst>
   </p:cSld>
@@ -5894,10 +7044,10 @@
       </p:grpSpPr>
       <p:sp>
         <p:nvSpPr>
-          <p:cNvPr id="6" name="Title 5">
+          <p:cNvPr id="7" name="Title 6">
             <a:extLst>
               <a:ext uri="{FF2B5EF4-FFF2-40B4-BE49-F238E27FC236}">
-                <a16:creationId xmlns:a16="http://schemas.microsoft.com/office/drawing/2014/main" id="{D9D67C43-CDA8-4A39-8419-5741D0013571}"/>
+                <a16:creationId xmlns:a16="http://schemas.microsoft.com/office/drawing/2014/main" id="{0F212CC8-757B-4DA1-875B-E1CEAFD4E313}"/>
               </a:ext>
             </a:extLst>
           </p:cNvPr>
@@ -5908,94 +7058,47 @@
             <p:ph type="title"/>
           </p:nvPr>
         </p:nvSpPr>
-        <p:spPr>
-          <a:xfrm>
-            <a:off x="1066800" y="102892"/>
-            <a:ext cx="10058400" cy="767119"/>
-          </a:xfrm>
-        </p:spPr>
+        <p:spPr/>
         <p:txBody>
           <a:bodyPr/>
           <a:lstStyle/>
           <a:p>
             <a:r>
               <a:rPr lang="en-US" dirty="0"/>
-              <a:t>Time-Series Cross-Validation</a:t>
-            </a:r>
-          </a:p>
-        </p:txBody>
-      </p:sp>
-      <p:pic>
-        <p:nvPicPr>
-          <p:cNvPr id="5" name="Content Placeholder 4">
+              <a:t>Modeling Demo in R</a:t>
+            </a:r>
+          </a:p>
+        </p:txBody>
+      </p:sp>
+      <p:sp>
+        <p:nvSpPr>
+          <p:cNvPr id="8" name="Text Placeholder 7">
             <a:extLst>
               <a:ext uri="{FF2B5EF4-FFF2-40B4-BE49-F238E27FC236}">
-                <a16:creationId xmlns:a16="http://schemas.microsoft.com/office/drawing/2014/main" id="{58A3D4D9-DEFD-4E21-864F-63460BC54F34}"/>
+                <a16:creationId xmlns:a16="http://schemas.microsoft.com/office/drawing/2014/main" id="{72EC659C-73E4-4391-8E78-9319018FAD14}"/>
               </a:ext>
             </a:extLst>
           </p:cNvPr>
-          <p:cNvPicPr>
-            <a:picLocks noGrp="1" noChangeAspect="1"/>
-          </p:cNvPicPr>
-          <p:nvPr>
-            <p:ph idx="4294967295"/>
-          </p:nvPr>
-        </p:nvPicPr>
-        <p:blipFill>
-          <a:blip r:embed="rId2"/>
-          <a:stretch>
-            <a:fillRect/>
-          </a:stretch>
-        </p:blipFill>
-        <p:spPr>
-          <a:xfrm>
-            <a:off x="1066800" y="736426"/>
-            <a:ext cx="9312675" cy="5734596"/>
-          </a:xfrm>
-          <a:prstGeom prst="rect">
-            <a:avLst/>
-          </a:prstGeom>
-        </p:spPr>
-      </p:pic>
-      <p:sp>
-        <p:nvSpPr>
-          <p:cNvPr id="7" name="TextBox 6">
-            <a:extLst>
-              <a:ext uri="{FF2B5EF4-FFF2-40B4-BE49-F238E27FC236}">
-                <a16:creationId xmlns:a16="http://schemas.microsoft.com/office/drawing/2014/main" id="{617F712D-16E1-4AF3-835D-97CAA7D7F037}"/>
-              </a:ext>
-            </a:extLst>
-          </p:cNvPr>
-          <p:cNvSpPr txBox="1"/>
-          <p:nvPr/>
-        </p:nvSpPr>
-        <p:spPr>
-          <a:xfrm>
-            <a:off x="1248927" y="6279713"/>
-            <a:ext cx="5023928" cy="461665"/>
-          </a:xfrm>
-          <a:prstGeom prst="rect">
-            <a:avLst/>
-          </a:prstGeom>
-          <a:noFill/>
-        </p:spPr>
-        <p:txBody>
-          <a:bodyPr wrap="square" rtlCol="0">
-            <a:spAutoFit/>
-          </a:bodyPr>
+          <p:cNvSpPr>
+            <a:spLocks noGrp="1"/>
+          </p:cNvSpPr>
+          <p:nvPr>
+            <p:ph type="body" idx="1"/>
+          </p:nvPr>
+        </p:nvSpPr>
+        <p:spPr/>
+        <p:txBody>
+          <a:bodyPr/>
           <a:lstStyle/>
           <a:p>
-            <a:r>
-              <a:rPr lang="en-US" sz="1200" dirty="0"/>
-              <a:t>Photo Credit: Prophet Online Docs https://facebook.github.io/prophet/docs/diagnostics.html</a:t>
-            </a:r>
+            <a:endParaRPr lang="en-US" dirty="0"/>
           </a:p>
         </p:txBody>
       </p:sp>
     </p:spTree>
     <p:extLst>
       <p:ext uri="{BB962C8B-B14F-4D97-AF65-F5344CB8AC3E}">
-        <p14:creationId xmlns:p14="http://schemas.microsoft.com/office/powerpoint/2010/main" val="2392247239"/>
+        <p14:creationId xmlns:p14="http://schemas.microsoft.com/office/powerpoint/2010/main" val="1615024739"/>
       </p:ext>
     </p:extLst>
   </p:cSld>
@@ -6024,6 +7127,211 @@
       </p:grpSpPr>
       <p:sp>
         <p:nvSpPr>
+          <p:cNvPr id="6" name="Title 5">
+            <a:extLst>
+              <a:ext uri="{FF2B5EF4-FFF2-40B4-BE49-F238E27FC236}">
+                <a16:creationId xmlns:a16="http://schemas.microsoft.com/office/drawing/2014/main" id="{D9D67C43-CDA8-4A39-8419-5741D0013571}"/>
+              </a:ext>
+            </a:extLst>
+          </p:cNvPr>
+          <p:cNvSpPr>
+            <a:spLocks noGrp="1"/>
+          </p:cNvSpPr>
+          <p:nvPr>
+            <p:ph type="title"/>
+          </p:nvPr>
+        </p:nvSpPr>
+        <p:spPr>
+          <a:xfrm>
+            <a:off x="1066800" y="102892"/>
+            <a:ext cx="10058400" cy="767119"/>
+          </a:xfrm>
+        </p:spPr>
+        <p:txBody>
+          <a:bodyPr/>
+          <a:lstStyle/>
+          <a:p>
+            <a:r>
+              <a:rPr lang="en-US" dirty="0"/>
+              <a:t>Time-Series Cross-Validation</a:t>
+            </a:r>
+          </a:p>
+        </p:txBody>
+      </p:sp>
+      <p:pic>
+        <p:nvPicPr>
+          <p:cNvPr id="5" name="Content Placeholder 4">
+            <a:extLst>
+              <a:ext uri="{FF2B5EF4-FFF2-40B4-BE49-F238E27FC236}">
+                <a16:creationId xmlns:a16="http://schemas.microsoft.com/office/drawing/2014/main" id="{58A3D4D9-DEFD-4E21-864F-63460BC54F34}"/>
+              </a:ext>
+            </a:extLst>
+          </p:cNvPr>
+          <p:cNvPicPr>
+            <a:picLocks noGrp="1" noChangeAspect="1"/>
+          </p:cNvPicPr>
+          <p:nvPr>
+            <p:ph idx="4294967295"/>
+          </p:nvPr>
+        </p:nvPicPr>
+        <p:blipFill>
+          <a:blip r:embed="rId3"/>
+          <a:stretch>
+            <a:fillRect/>
+          </a:stretch>
+        </p:blipFill>
+        <p:spPr>
+          <a:xfrm>
+            <a:off x="1066800" y="736426"/>
+            <a:ext cx="9312675" cy="5734596"/>
+          </a:xfrm>
+          <a:prstGeom prst="rect">
+            <a:avLst/>
+          </a:prstGeom>
+        </p:spPr>
+      </p:pic>
+      <p:sp>
+        <p:nvSpPr>
+          <p:cNvPr id="7" name="TextBox 6">
+            <a:extLst>
+              <a:ext uri="{FF2B5EF4-FFF2-40B4-BE49-F238E27FC236}">
+                <a16:creationId xmlns:a16="http://schemas.microsoft.com/office/drawing/2014/main" id="{617F712D-16E1-4AF3-835D-97CAA7D7F037}"/>
+              </a:ext>
+            </a:extLst>
+          </p:cNvPr>
+          <p:cNvSpPr txBox="1"/>
+          <p:nvPr/>
+        </p:nvSpPr>
+        <p:spPr>
+          <a:xfrm>
+            <a:off x="1248927" y="6279713"/>
+            <a:ext cx="5023928" cy="461665"/>
+          </a:xfrm>
+          <a:prstGeom prst="rect">
+            <a:avLst/>
+          </a:prstGeom>
+          <a:noFill/>
+        </p:spPr>
+        <p:txBody>
+          <a:bodyPr wrap="square" rtlCol="0">
+            <a:spAutoFit/>
+          </a:bodyPr>
+          <a:lstStyle/>
+          <a:p>
+            <a:r>
+              <a:rPr lang="en-US" sz="1200" dirty="0"/>
+              <a:t>Photo Credit: Prophet Online Docs https://facebook.github.io/prophet/docs/diagnostics.html</a:t>
+            </a:r>
+          </a:p>
+        </p:txBody>
+      </p:sp>
+    </p:spTree>
+    <p:extLst>
+      <p:ext uri="{BB962C8B-B14F-4D97-AF65-F5344CB8AC3E}">
+        <p14:creationId xmlns:p14="http://schemas.microsoft.com/office/powerpoint/2010/main" val="2392247239"/>
+      </p:ext>
+    </p:extLst>
+  </p:cSld>
+  <p:clrMapOvr>
+    <a:masterClrMapping/>
+  </p:clrMapOvr>
+  <p:timing>
+    <p:tnLst>
+      <p:par>
+        <p:cTn id="1" dur="indefinite" restart="never" nodeType="tmRoot">
+          <p:childTnLst>
+            <p:seq concurrent="1" nextAc="seek">
+              <p:cTn id="2" dur="indefinite" nodeType="mainSeq">
+                <p:childTnLst>
+                  <p:par>
+                    <p:cTn id="3" fill="hold">
+                      <p:stCondLst>
+                        <p:cond delay="indefinite"/>
+                      </p:stCondLst>
+                      <p:childTnLst>
+                        <p:par>
+                          <p:cTn id="4" fill="hold">
+                            <p:stCondLst>
+                              <p:cond delay="0"/>
+                            </p:stCondLst>
+                            <p:childTnLst>
+                              <p:par>
+                                <p:cTn id="5" presetID="1" presetClass="entr" presetSubtype="0" fill="hold" nodeType="clickEffect">
+                                  <p:stCondLst>
+                                    <p:cond delay="0"/>
+                                  </p:stCondLst>
+                                  <p:childTnLst>
+                                    <p:set>
+                                      <p:cBhvr>
+                                        <p:cTn id="6" dur="1" fill="hold">
+                                          <p:stCondLst>
+                                            <p:cond delay="0"/>
+                                          </p:stCondLst>
+                                        </p:cTn>
+                                        <p:tgtEl>
+                                          <p:spTgt spid="5"/>
+                                        </p:tgtEl>
+                                        <p:attrNameLst>
+                                          <p:attrName>style.visibility</p:attrName>
+                                        </p:attrNameLst>
+                                      </p:cBhvr>
+                                      <p:to>
+                                        <p:strVal val="visible"/>
+                                      </p:to>
+                                    </p:set>
+                                  </p:childTnLst>
+                                </p:cTn>
+                              </p:par>
+                            </p:childTnLst>
+                          </p:cTn>
+                        </p:par>
+                      </p:childTnLst>
+                    </p:cTn>
+                  </p:par>
+                </p:childTnLst>
+              </p:cTn>
+              <p:prevCondLst>
+                <p:cond evt="onPrev" delay="0">
+                  <p:tgtEl>
+                    <p:sldTgt/>
+                  </p:tgtEl>
+                </p:cond>
+              </p:prevCondLst>
+              <p:nextCondLst>
+                <p:cond evt="onNext" delay="0">
+                  <p:tgtEl>
+                    <p:sldTgt/>
+                  </p:tgtEl>
+                </p:cond>
+              </p:nextCondLst>
+            </p:seq>
+          </p:childTnLst>
+        </p:cTn>
+      </p:par>
+    </p:tnLst>
+  </p:timing>
+</p:sld>
+</file>
+
+<file path=ppt/slides/slide7.xml><?xml version="1.0" encoding="utf-8"?>
+<p:sld xmlns:a="http://schemas.openxmlformats.org/drawingml/2006/main" xmlns:r="http://schemas.openxmlformats.org/officeDocument/2006/relationships" xmlns:p="http://schemas.openxmlformats.org/presentationml/2006/main">
+  <p:cSld>
+    <p:spTree>
+      <p:nvGrpSpPr>
+        <p:cNvPr id="1" name=""/>
+        <p:cNvGrpSpPr/>
+        <p:nvPr/>
+      </p:nvGrpSpPr>
+      <p:grpSpPr>
+        <a:xfrm>
+          <a:off x="0" y="0"/>
+          <a:ext cx="0" cy="0"/>
+          <a:chOff x="0" y="0"/>
+          <a:chExt cx="0" cy="0"/>
+        </a:xfrm>
+      </p:grpSpPr>
+      <p:sp>
+        <p:nvSpPr>
           <p:cNvPr id="5" name="Title 4">
             <a:extLst>
               <a:ext uri="{FF2B5EF4-FFF2-40B4-BE49-F238E27FC236}">
@@ -6103,7 +7411,7 @@
           </p:nvPr>
         </p:nvPicPr>
         <p:blipFill>
-          <a:blip r:embed="rId2"/>
+          <a:blip r:embed="rId3"/>
           <a:stretch>
             <a:fillRect/>
           </a:stretch>
@@ -6128,7 +7436,7 @@
 </p:sld>
 </file>
 
-<file path=ppt/slides/slide7.xml><?xml version="1.0" encoding="utf-8"?>
+<file path=ppt/slides/slide8.xml><?xml version="1.0" encoding="utf-8"?>
 <p:sld xmlns:a="http://schemas.openxmlformats.org/drawingml/2006/main" xmlns:r="http://schemas.openxmlformats.org/officeDocument/2006/relationships" xmlns:p="http://schemas.openxmlformats.org/presentationml/2006/main">
   <p:cSld>
     <p:spTree>
@@ -6160,7 +7468,7 @@
           <p:nvPr/>
         </p:nvPicPr>
         <p:blipFill>
-          <a:blip r:embed="rId2"/>
+          <a:blip r:embed="rId3"/>
           <a:stretch>
             <a:fillRect/>
           </a:stretch>
@@ -6188,7 +7496,7 @@
 </p:sld>
 </file>
 
-<file path=ppt/slides/slide8.xml><?xml version="1.0" encoding="utf-8"?>
+<file path=ppt/slides/slide9.xml><?xml version="1.0" encoding="utf-8"?>
 <p:sld xmlns:a="http://schemas.openxmlformats.org/drawingml/2006/main" xmlns:r="http://schemas.openxmlformats.org/officeDocument/2006/relationships" xmlns:p="http://schemas.openxmlformats.org/presentationml/2006/main">
   <p:cSld>
     <p:spTree>
@@ -6302,66 +7610,6 @@
     <p:extLst>
       <p:ext uri="{BB962C8B-B14F-4D97-AF65-F5344CB8AC3E}">
         <p14:creationId xmlns:p14="http://schemas.microsoft.com/office/powerpoint/2010/main" val="2177184996"/>
-      </p:ext>
-    </p:extLst>
-  </p:cSld>
-  <p:clrMapOvr>
-    <a:masterClrMapping/>
-  </p:clrMapOvr>
-</p:sld>
-</file>
-
-<file path=ppt/slides/slide9.xml><?xml version="1.0" encoding="utf-8"?>
-<p:sld xmlns:a="http://schemas.openxmlformats.org/drawingml/2006/main" xmlns:r="http://schemas.openxmlformats.org/officeDocument/2006/relationships" xmlns:p="http://schemas.openxmlformats.org/presentationml/2006/main">
-  <p:cSld>
-    <p:spTree>
-      <p:nvGrpSpPr>
-        <p:cNvPr id="1" name=""/>
-        <p:cNvGrpSpPr/>
-        <p:nvPr/>
-      </p:nvGrpSpPr>
-      <p:grpSpPr>
-        <a:xfrm>
-          <a:off x="0" y="0"/>
-          <a:ext cx="0" cy="0"/>
-          <a:chOff x="0" y="0"/>
-          <a:chExt cx="0" cy="0"/>
-        </a:xfrm>
-      </p:grpSpPr>
-      <p:pic>
-        <p:nvPicPr>
-          <p:cNvPr id="5" name="Picture 4">
-            <a:extLst>
-              <a:ext uri="{FF2B5EF4-FFF2-40B4-BE49-F238E27FC236}">
-                <a16:creationId xmlns:a16="http://schemas.microsoft.com/office/drawing/2014/main" id="{6BD7029E-33AC-4B58-93AF-AD58EB99CEDD}"/>
-              </a:ext>
-            </a:extLst>
-          </p:cNvPr>
-          <p:cNvPicPr>
-            <a:picLocks noChangeAspect="1"/>
-          </p:cNvPicPr>
-          <p:nvPr/>
-        </p:nvPicPr>
-        <p:blipFill>
-          <a:blip r:embed="rId2"/>
-          <a:stretch>
-            <a:fillRect/>
-          </a:stretch>
-        </p:blipFill>
-        <p:spPr>
-          <a:xfrm>
-            <a:off x="2051586" y="166262"/>
-            <a:ext cx="8088827" cy="6691738"/>
-          </a:xfrm>
-          <a:prstGeom prst="rect">
-            <a:avLst/>
-          </a:prstGeom>
-        </p:spPr>
-      </p:pic>
-    </p:spTree>
-    <p:extLst>
-      <p:ext uri="{BB962C8B-B14F-4D97-AF65-F5344CB8AC3E}">
-        <p14:creationId xmlns:p14="http://schemas.microsoft.com/office/powerpoint/2010/main" val="1080001726"/>
       </p:ext>
     </p:extLst>
   </p:cSld>

</xml_diff>